<commit_message>
PPT + show terminé
</commit_message>
<xml_diff>
--- a/Présentation1.pptx
+++ b/Présentation1.pptx
@@ -17,11 +17,12 @@
     <p:sldId id="267" r:id="rId11"/>
     <p:sldId id="268" r:id="rId12"/>
     <p:sldId id="269" r:id="rId13"/>
-    <p:sldId id="270" r:id="rId14"/>
-    <p:sldId id="271" r:id="rId15"/>
-    <p:sldId id="273" r:id="rId16"/>
-    <p:sldId id="274" r:id="rId17"/>
-    <p:sldId id="275" r:id="rId18"/>
+    <p:sldId id="276" r:id="rId14"/>
+    <p:sldId id="270" r:id="rId15"/>
+    <p:sldId id="271" r:id="rId16"/>
+    <p:sldId id="273" r:id="rId17"/>
+    <p:sldId id="274" r:id="rId18"/>
+    <p:sldId id="275" r:id="rId19"/>
   </p:sldIdLst>
   <p:sldSz cx="9144000" cy="6858000" type="screen4x3"/>
   <p:notesSz cx="6858000" cy="9144000"/>
@@ -828,8 +829,16 @@
         <p:spPr/>
         <p:txBody>
           <a:bodyPr/>
-          <a:lstStyle/>
-          <a:p>
+          <a:lstStyle>
+            <a:lvl1pPr>
+              <a:defRPr u="sng"/>
+            </a:lvl1pPr>
+          </a:lstStyle>
+          <a:p>
+            <a:r>
+              <a:rPr lang="fr-FR" dirty="0" smtClean="0"/>
+              <a:t>UQAC – Sécurité 8INF857</a:t>
+            </a:r>
             <a:endParaRPr lang="fr-FR" dirty="0"/>
           </a:p>
         </p:txBody>
@@ -862,6 +871,13 @@
   <p:clrMapOvr>
     <a:masterClrMapping/>
   </p:clrMapOvr>
+  <p:timing>
+    <p:tnLst>
+      <p:par>
+        <p:cTn id="1" dur="indefinite" restart="never" nodeType="tmRoot"/>
+      </p:par>
+    </p:tnLst>
+  </p:timing>
 </p:sldLayout>
 </file>
 
@@ -2533,9 +2549,28 @@
 <p:sldMaster xmlns:a="http://schemas.openxmlformats.org/drawingml/2006/main" xmlns:r="http://schemas.openxmlformats.org/officeDocument/2006/relationships" xmlns:p="http://schemas.openxmlformats.org/presentationml/2006/main">
   <p:cSld>
     <p:bg>
-      <p:bgRef idx="1001">
-        <a:schemeClr val="bg1"/>
-      </p:bgRef>
+      <p:bgPr>
+        <a:gradFill flip="none" rotWithShape="1">
+          <a:gsLst>
+            <a:gs pos="0">
+              <a:schemeClr val="bg1">
+                <a:tint val="80000"/>
+                <a:satMod val="300000"/>
+              </a:schemeClr>
+            </a:gs>
+            <a:gs pos="100000">
+              <a:schemeClr val="bg1">
+                <a:lumMod val="95000"/>
+              </a:schemeClr>
+            </a:gs>
+          </a:gsLst>
+          <a:path path="circle">
+            <a:fillToRect l="50000" t="50000" r="50000" b="50000"/>
+          </a:path>
+          <a:tileRect/>
+        </a:gradFill>
+        <a:effectLst/>
+      </p:bgPr>
     </p:bg>
     <p:spTree>
       <p:nvGrpSpPr>
@@ -3350,8 +3385,13 @@
             </a:pPr>
             <a:r>
               <a:rPr lang="fr-FR" sz="2400" dirty="0" smtClean="0"/>
-              <a:t>Du nom Associé</a:t>
-            </a:r>
+              <a:t>Du nom </a:t>
+            </a:r>
+            <a:r>
+              <a:rPr lang="fr-FR" sz="2400" dirty="0" smtClean="0"/>
+              <a:t>associé</a:t>
+            </a:r>
+            <a:endParaRPr lang="fr-FR" sz="2400" dirty="0" smtClean="0"/>
           </a:p>
           <a:p>
             <a:pPr>
@@ -4116,6 +4156,447 @@
           </a:p>
         </p:txBody>
       </p:sp>
+      <p:pic>
+        <p:nvPicPr>
+          <p:cNvPr id="1026" name="Picture 2"/>
+          <p:cNvPicPr>
+            <a:picLocks noChangeAspect="1" noChangeArrowheads="1"/>
+          </p:cNvPicPr>
+          <p:nvPr/>
+        </p:nvPicPr>
+        <p:blipFill>
+          <a:blip r:embed="rId2">
+            <a:extLst>
+              <a:ext uri="{28A0092B-C50C-407E-A947-70E740481C1C}">
+                <a14:useLocalDpi xmlns:a14="http://schemas.microsoft.com/office/drawing/2010/main" val="0"/>
+              </a:ext>
+            </a:extLst>
+          </a:blip>
+          <a:srcRect/>
+          <a:stretch>
+            <a:fillRect/>
+          </a:stretch>
+        </p:blipFill>
+        <p:spPr bwMode="auto">
+          <a:xfrm rot="21324321">
+            <a:off x="654968" y="3015110"/>
+            <a:ext cx="3657600" cy="466725"/>
+          </a:xfrm>
+          <a:prstGeom prst="rect">
+            <a:avLst/>
+          </a:prstGeom>
+          <a:noFill/>
+          <a:ln>
+            <a:noFill/>
+          </a:ln>
+          <a:extLst>
+            <a:ext uri="{909E8E84-426E-40DD-AFC4-6F175D3DCCD1}">
+              <a14:hiddenFill xmlns:a14="http://schemas.microsoft.com/office/drawing/2010/main">
+                <a:solidFill>
+                  <a:schemeClr val="accent1"/>
+                </a:solidFill>
+              </a14:hiddenFill>
+            </a:ext>
+            <a:ext uri="{91240B29-F687-4F45-9708-019B960494DF}">
+              <a14:hiddenLine xmlns:a14="http://schemas.microsoft.com/office/drawing/2010/main" w="9525">
+                <a:solidFill>
+                  <a:schemeClr val="tx1"/>
+                </a:solidFill>
+                <a:miter lim="800000"/>
+                <a:headEnd/>
+                <a:tailEnd/>
+              </a14:hiddenLine>
+            </a:ext>
+          </a:extLst>
+        </p:spPr>
+      </p:pic>
+      <p:pic>
+        <p:nvPicPr>
+          <p:cNvPr id="1027" name="Picture 3"/>
+          <p:cNvPicPr>
+            <a:picLocks noChangeAspect="1" noChangeArrowheads="1"/>
+          </p:cNvPicPr>
+          <p:nvPr/>
+        </p:nvPicPr>
+        <p:blipFill>
+          <a:blip r:embed="rId3">
+            <a:extLst>
+              <a:ext uri="{28A0092B-C50C-407E-A947-70E740481C1C}">
+                <a14:useLocalDpi xmlns:a14="http://schemas.microsoft.com/office/drawing/2010/main" val="0"/>
+              </a:ext>
+            </a:extLst>
+          </a:blip>
+          <a:srcRect/>
+          <a:stretch>
+            <a:fillRect/>
+          </a:stretch>
+        </p:blipFill>
+        <p:spPr bwMode="auto">
+          <a:xfrm rot="181178">
+            <a:off x="2460863" y="3763197"/>
+            <a:ext cx="5867400" cy="447675"/>
+          </a:xfrm>
+          <a:prstGeom prst="rect">
+            <a:avLst/>
+          </a:prstGeom>
+          <a:noFill/>
+          <a:ln>
+            <a:noFill/>
+          </a:ln>
+          <a:extLst>
+            <a:ext uri="{909E8E84-426E-40DD-AFC4-6F175D3DCCD1}">
+              <a14:hiddenFill xmlns:a14="http://schemas.microsoft.com/office/drawing/2010/main">
+                <a:solidFill>
+                  <a:schemeClr val="accent1"/>
+                </a:solidFill>
+              </a14:hiddenFill>
+            </a:ext>
+            <a:ext uri="{91240B29-F687-4F45-9708-019B960494DF}">
+              <a14:hiddenLine xmlns:a14="http://schemas.microsoft.com/office/drawing/2010/main" w="9525">
+                <a:solidFill>
+                  <a:schemeClr val="tx1"/>
+                </a:solidFill>
+                <a:miter lim="800000"/>
+                <a:headEnd/>
+                <a:tailEnd/>
+              </a14:hiddenLine>
+            </a:ext>
+          </a:extLst>
+        </p:spPr>
+      </p:pic>
+      <p:sp>
+        <p:nvSpPr>
+          <p:cNvPr id="3" name="ZoneTexte 2"/>
+          <p:cNvSpPr txBox="1"/>
+          <p:nvPr/>
+        </p:nvSpPr>
+        <p:spPr>
+          <a:xfrm>
+            <a:off x="866907" y="1703891"/>
+            <a:ext cx="8277093" cy="1292662"/>
+          </a:xfrm>
+          <a:prstGeom prst="rect">
+            <a:avLst/>
+          </a:prstGeom>
+          <a:noFill/>
+        </p:spPr>
+        <p:txBody>
+          <a:bodyPr wrap="square" rtlCol="0">
+            <a:spAutoFit/>
+          </a:bodyPr>
+          <a:lstStyle/>
+          <a:p>
+            <a:r>
+              <a:rPr lang="fr-FR" sz="2400" b="1" u="sng" dirty="0" smtClean="0"/>
+              <a:t>Côté client</a:t>
+            </a:r>
+            <a:r>
+              <a:rPr lang="fr-FR" sz="2400" b="1" dirty="0" smtClean="0"/>
+              <a:t> : application Android</a:t>
+            </a:r>
+          </a:p>
+          <a:p>
+            <a:endParaRPr lang="fr-FR" b="1" u="sng" dirty="0" smtClean="0"/>
+          </a:p>
+          <a:p>
+            <a:pPr marL="285750" indent="-285750">
+              <a:buFont typeface="Arial" panose="020B0604020202020204" pitchFamily="34" charset="0"/>
+              <a:buChar char="•"/>
+            </a:pPr>
+            <a:r>
+              <a:rPr lang="fr-FR" dirty="0" smtClean="0"/>
+              <a:t>Récupération des SMS reçus et envoyés, des contacts, (numéros, adresses, noms), de l’historique de navigation, des informations du téléphone et de son propriétaire</a:t>
+            </a:r>
+            <a:endParaRPr lang="fr-FR" dirty="0"/>
+          </a:p>
+        </p:txBody>
+      </p:sp>
+      <p:pic>
+        <p:nvPicPr>
+          <p:cNvPr id="1028" name="Picture 4"/>
+          <p:cNvPicPr>
+            <a:picLocks noChangeAspect="1" noChangeArrowheads="1"/>
+          </p:cNvPicPr>
+          <p:nvPr/>
+        </p:nvPicPr>
+        <p:blipFill>
+          <a:blip r:embed="rId4">
+            <a:extLst>
+              <a:ext uri="{28A0092B-C50C-407E-A947-70E740481C1C}">
+                <a14:useLocalDpi xmlns:a14="http://schemas.microsoft.com/office/drawing/2010/main" val="0"/>
+              </a:ext>
+            </a:extLst>
+          </a:blip>
+          <a:srcRect/>
+          <a:stretch>
+            <a:fillRect/>
+          </a:stretch>
+        </p:blipFill>
+        <p:spPr bwMode="auto">
+          <a:xfrm>
+            <a:off x="5005453" y="2934147"/>
+            <a:ext cx="3648075" cy="314325"/>
+          </a:xfrm>
+          <a:prstGeom prst="rect">
+            <a:avLst/>
+          </a:prstGeom>
+          <a:noFill/>
+          <a:ln>
+            <a:noFill/>
+          </a:ln>
+          <a:extLst>
+            <a:ext uri="{909E8E84-426E-40DD-AFC4-6F175D3DCCD1}">
+              <a14:hiddenFill xmlns:a14="http://schemas.microsoft.com/office/drawing/2010/main">
+                <a:solidFill>
+                  <a:schemeClr val="accent1"/>
+                </a:solidFill>
+              </a14:hiddenFill>
+            </a:ext>
+            <a:ext uri="{91240B29-F687-4F45-9708-019B960494DF}">
+              <a14:hiddenLine xmlns:a14="http://schemas.microsoft.com/office/drawing/2010/main" w="9525">
+                <a:solidFill>
+                  <a:schemeClr val="tx1"/>
+                </a:solidFill>
+                <a:miter lim="800000"/>
+                <a:headEnd/>
+                <a:tailEnd/>
+              </a14:hiddenLine>
+            </a:ext>
+          </a:extLst>
+        </p:spPr>
+      </p:pic>
+      <p:sp>
+        <p:nvSpPr>
+          <p:cNvPr id="4" name="ZoneTexte 3"/>
+          <p:cNvSpPr txBox="1"/>
+          <p:nvPr/>
+        </p:nvSpPr>
+        <p:spPr>
+          <a:xfrm>
+            <a:off x="845381" y="4468480"/>
+            <a:ext cx="7704856" cy="2369880"/>
+          </a:xfrm>
+          <a:prstGeom prst="rect">
+            <a:avLst/>
+          </a:prstGeom>
+          <a:noFill/>
+        </p:spPr>
+        <p:txBody>
+          <a:bodyPr wrap="square" rtlCol="0">
+            <a:spAutoFit/>
+          </a:bodyPr>
+          <a:lstStyle/>
+          <a:p>
+            <a:pPr marL="285750" indent="-285750">
+              <a:buFont typeface="Arial" panose="020B0604020202020204" pitchFamily="34" charset="0"/>
+              <a:buChar char="•"/>
+            </a:pPr>
+            <a:r>
+              <a:rPr lang="fr-FR" dirty="0" smtClean="0"/>
+              <a:t>Formatage des données en XML (téléphone moyen : plus de 400Ko de données en texte brut)</a:t>
+            </a:r>
+            <a:endParaRPr lang="fr-FR" dirty="0"/>
+          </a:p>
+          <a:p>
+            <a:endParaRPr lang="fr-FR" sz="1400" b="1" dirty="0" smtClean="0">
+              <a:latin typeface="Consolas" panose="020B0609020204030204" pitchFamily="49" charset="0"/>
+              <a:cs typeface="Consolas" panose="020B0609020204030204" pitchFamily="49" charset="0"/>
+            </a:endParaRPr>
+          </a:p>
+          <a:p>
+            <a:r>
+              <a:rPr lang="fr-FR" sz="1400" b="1" dirty="0" smtClean="0">
+                <a:latin typeface="Consolas" panose="020B0609020204030204" pitchFamily="49" charset="0"/>
+                <a:cs typeface="Consolas" panose="020B0609020204030204" pitchFamily="49" charset="0"/>
+              </a:rPr>
+              <a:t>&lt;</a:t>
+            </a:r>
+            <a:r>
+              <a:rPr lang="fr-FR" sz="1400" b="1" dirty="0">
+                <a:latin typeface="Consolas" panose="020B0609020204030204" pitchFamily="49" charset="0"/>
+                <a:cs typeface="Consolas" panose="020B0609020204030204" pitchFamily="49" charset="0"/>
+              </a:rPr>
+              <a:t>ALL</a:t>
+            </a:r>
+            <a:r>
+              <a:rPr lang="fr-FR" sz="1400" b="1" dirty="0" smtClean="0">
+                <a:latin typeface="Consolas" panose="020B0609020204030204" pitchFamily="49" charset="0"/>
+                <a:cs typeface="Consolas" panose="020B0609020204030204" pitchFamily="49" charset="0"/>
+              </a:rPr>
+              <a:t>&gt;</a:t>
+            </a:r>
+          </a:p>
+          <a:p>
+            <a:pPr lvl="1"/>
+            <a:r>
+              <a:rPr lang="fr-FR" sz="1400" b="1" dirty="0" smtClean="0">
+                <a:latin typeface="Consolas" panose="020B0609020204030204" pitchFamily="49" charset="0"/>
+                <a:cs typeface="Consolas" panose="020B0609020204030204" pitchFamily="49" charset="0"/>
+              </a:rPr>
+              <a:t>&lt;</a:t>
+            </a:r>
+            <a:r>
+              <a:rPr lang="fr-FR" sz="1400" b="1" dirty="0">
+                <a:latin typeface="Consolas" panose="020B0609020204030204" pitchFamily="49" charset="0"/>
+                <a:cs typeface="Consolas" panose="020B0609020204030204" pitchFamily="49" charset="0"/>
+              </a:rPr>
+              <a:t>ALLHISTORY</a:t>
+            </a:r>
+            <a:r>
+              <a:rPr lang="fr-FR" sz="1400" b="1" dirty="0" smtClean="0">
+                <a:latin typeface="Consolas" panose="020B0609020204030204" pitchFamily="49" charset="0"/>
+                <a:cs typeface="Consolas" panose="020B0609020204030204" pitchFamily="49" charset="0"/>
+              </a:rPr>
+              <a:t>&gt;</a:t>
+            </a:r>
+          </a:p>
+          <a:p>
+            <a:pPr lvl="2"/>
+            <a:r>
+              <a:rPr lang="fr-FR" sz="1400" b="1" dirty="0" smtClean="0">
+                <a:latin typeface="Consolas" panose="020B0609020204030204" pitchFamily="49" charset="0"/>
+                <a:cs typeface="Consolas" panose="020B0609020204030204" pitchFamily="49" charset="0"/>
+              </a:rPr>
+              <a:t>&lt;</a:t>
+            </a:r>
+            <a:r>
+              <a:rPr lang="fr-FR" sz="1400" b="1" dirty="0" err="1">
+                <a:latin typeface="Consolas" panose="020B0609020204030204" pitchFamily="49" charset="0"/>
+                <a:cs typeface="Consolas" panose="020B0609020204030204" pitchFamily="49" charset="0"/>
+              </a:rPr>
+              <a:t>browserPage</a:t>
+            </a:r>
+            <a:r>
+              <a:rPr lang="fr-FR" sz="1400" b="1" dirty="0" smtClean="0">
+                <a:latin typeface="Consolas" panose="020B0609020204030204" pitchFamily="49" charset="0"/>
+                <a:cs typeface="Consolas" panose="020B0609020204030204" pitchFamily="49" charset="0"/>
+              </a:rPr>
+              <a:t>&gt;</a:t>
+            </a:r>
+          </a:p>
+          <a:p>
+            <a:pPr lvl="3"/>
+            <a:r>
+              <a:rPr lang="fr-FR" sz="1400" b="1" dirty="0" smtClean="0">
+                <a:latin typeface="Consolas" panose="020B0609020204030204" pitchFamily="49" charset="0"/>
+                <a:cs typeface="Consolas" panose="020B0609020204030204" pitchFamily="49" charset="0"/>
+              </a:rPr>
+              <a:t>&lt;</a:t>
+            </a:r>
+            <a:r>
+              <a:rPr lang="fr-FR" sz="1400" b="1" dirty="0" err="1" smtClean="0">
+                <a:latin typeface="Consolas" panose="020B0609020204030204" pitchFamily="49" charset="0"/>
+                <a:cs typeface="Consolas" panose="020B0609020204030204" pitchFamily="49" charset="0"/>
+              </a:rPr>
+              <a:t>title</a:t>
+            </a:r>
+            <a:r>
+              <a:rPr lang="fr-FR" sz="1400" b="1" dirty="0" smtClean="0">
+                <a:latin typeface="Consolas" panose="020B0609020204030204" pitchFamily="49" charset="0"/>
+                <a:cs typeface="Consolas" panose="020B0609020204030204" pitchFamily="49" charset="0"/>
+              </a:rPr>
+              <a:t>&gt;Université du Québec à Chicoutimi - UQAC</a:t>
+            </a:r>
+            <a:r>
+              <a:rPr lang="fr-FR" sz="1400" b="1" dirty="0">
+                <a:latin typeface="Consolas" panose="020B0609020204030204" pitchFamily="49" charset="0"/>
+                <a:cs typeface="Consolas" panose="020B0609020204030204" pitchFamily="49" charset="0"/>
+              </a:rPr>
+              <a:t>&lt;/</a:t>
+            </a:r>
+            <a:r>
+              <a:rPr lang="fr-FR" sz="1400" b="1" dirty="0" err="1">
+                <a:latin typeface="Consolas" panose="020B0609020204030204" pitchFamily="49" charset="0"/>
+                <a:cs typeface="Consolas" panose="020B0609020204030204" pitchFamily="49" charset="0"/>
+              </a:rPr>
+              <a:t>title</a:t>
+            </a:r>
+            <a:r>
+              <a:rPr lang="fr-FR" sz="1400" b="1" dirty="0" smtClean="0">
+                <a:latin typeface="Consolas" panose="020B0609020204030204" pitchFamily="49" charset="0"/>
+                <a:cs typeface="Consolas" panose="020B0609020204030204" pitchFamily="49" charset="0"/>
+              </a:rPr>
+              <a:t>&gt;</a:t>
+            </a:r>
+          </a:p>
+          <a:p>
+            <a:pPr lvl="3"/>
+            <a:r>
+              <a:rPr lang="fr-FR" sz="1400" b="1" dirty="0" smtClean="0">
+                <a:latin typeface="Consolas" panose="020B0609020204030204" pitchFamily="49" charset="0"/>
+                <a:cs typeface="Consolas" panose="020B0609020204030204" pitchFamily="49" charset="0"/>
+              </a:rPr>
+              <a:t>&lt;</a:t>
+            </a:r>
+            <a:r>
+              <a:rPr lang="fr-FR" sz="1400" b="1" dirty="0">
+                <a:latin typeface="Consolas" panose="020B0609020204030204" pitchFamily="49" charset="0"/>
+                <a:cs typeface="Consolas" panose="020B0609020204030204" pitchFamily="49" charset="0"/>
+              </a:rPr>
+              <a:t>url&gt;http://www.uqac.ca/&lt;/url</a:t>
+            </a:r>
+            <a:r>
+              <a:rPr lang="fr-FR" sz="1400" b="1" dirty="0" smtClean="0">
+                <a:latin typeface="Consolas" panose="020B0609020204030204" pitchFamily="49" charset="0"/>
+                <a:cs typeface="Consolas" panose="020B0609020204030204" pitchFamily="49" charset="0"/>
+              </a:rPr>
+              <a:t>&gt;</a:t>
+            </a:r>
+          </a:p>
+          <a:p>
+            <a:pPr lvl="2"/>
+            <a:r>
+              <a:rPr lang="fr-FR" sz="1400" b="1" dirty="0" smtClean="0">
+                <a:latin typeface="Consolas" panose="020B0609020204030204" pitchFamily="49" charset="0"/>
+                <a:cs typeface="Consolas" panose="020B0609020204030204" pitchFamily="49" charset="0"/>
+              </a:rPr>
+              <a:t>&lt;/</a:t>
+            </a:r>
+            <a:r>
+              <a:rPr lang="fr-FR" sz="1400" b="1" dirty="0" err="1">
+                <a:latin typeface="Consolas" panose="020B0609020204030204" pitchFamily="49" charset="0"/>
+                <a:cs typeface="Consolas" panose="020B0609020204030204" pitchFamily="49" charset="0"/>
+              </a:rPr>
+              <a:t>browserPage</a:t>
+            </a:r>
+            <a:r>
+              <a:rPr lang="fr-FR" sz="1400" b="1" dirty="0" smtClean="0">
+                <a:latin typeface="Consolas" panose="020B0609020204030204" pitchFamily="49" charset="0"/>
+                <a:cs typeface="Consolas" panose="020B0609020204030204" pitchFamily="49" charset="0"/>
+              </a:rPr>
+              <a:t>&gt;</a:t>
+            </a:r>
+          </a:p>
+          <a:p>
+            <a:pPr lvl="2"/>
+            <a:r>
+              <a:rPr lang="fr-FR" sz="1400" b="1" dirty="0" smtClean="0">
+                <a:latin typeface="Consolas" panose="020B0609020204030204" pitchFamily="49" charset="0"/>
+                <a:cs typeface="Consolas" panose="020B0609020204030204" pitchFamily="49" charset="0"/>
+              </a:rPr>
+              <a:t>&lt;</a:t>
+            </a:r>
+            <a:r>
+              <a:rPr lang="fr-FR" sz="1400" b="1" dirty="0" err="1">
+                <a:latin typeface="Consolas" panose="020B0609020204030204" pitchFamily="49" charset="0"/>
+                <a:cs typeface="Consolas" panose="020B0609020204030204" pitchFamily="49" charset="0"/>
+              </a:rPr>
+              <a:t>browserPage</a:t>
+            </a:r>
+            <a:r>
+              <a:rPr lang="fr-FR" sz="1400" b="1" dirty="0" smtClean="0">
+                <a:latin typeface="Consolas" panose="020B0609020204030204" pitchFamily="49" charset="0"/>
+                <a:cs typeface="Consolas" panose="020B0609020204030204" pitchFamily="49" charset="0"/>
+              </a:rPr>
+              <a:t>&gt;…</a:t>
+            </a:r>
+            <a:endParaRPr lang="fr-FR" sz="1400" b="1" dirty="0">
+              <a:latin typeface="Consolas" panose="020B0609020204030204" pitchFamily="49" charset="0"/>
+              <a:cs typeface="Consolas" panose="020B0609020204030204" pitchFamily="49" charset="0"/>
+            </a:endParaRPr>
+          </a:p>
+        </p:txBody>
+      </p:sp>
     </p:spTree>
   </p:cSld>
   <p:clrMapOvr>
@@ -4125,9 +4606,258 @@
   <p:timing>
     <p:tnLst>
       <p:par>
-        <p:cTn id="1" dur="indefinite" restart="never" nodeType="tmRoot"/>
+        <p:cTn id="1" dur="indefinite" restart="never" nodeType="tmRoot">
+          <p:childTnLst>
+            <p:seq concurrent="1" nextAc="seek">
+              <p:cTn id="2" dur="indefinite" nodeType="mainSeq">
+                <p:childTnLst>
+                  <p:par>
+                    <p:cTn id="3" fill="hold">
+                      <p:stCondLst>
+                        <p:cond delay="indefinite"/>
+                      </p:stCondLst>
+                      <p:childTnLst>
+                        <p:par>
+                          <p:cTn id="4" fill="hold">
+                            <p:stCondLst>
+                              <p:cond delay="0"/>
+                            </p:stCondLst>
+                            <p:childTnLst>
+                              <p:par>
+                                <p:cTn id="5" presetID="1" presetClass="entr" presetSubtype="0" fill="hold" grpId="0" nodeType="clickEffect">
+                                  <p:stCondLst>
+                                    <p:cond delay="0"/>
+                                  </p:stCondLst>
+                                  <p:childTnLst>
+                                    <p:set>
+                                      <p:cBhvr>
+                                        <p:cTn id="6" dur="1" fill="hold">
+                                          <p:stCondLst>
+                                            <p:cond delay="0"/>
+                                          </p:stCondLst>
+                                        </p:cTn>
+                                        <p:tgtEl>
+                                          <p:spTgt spid="3"/>
+                                        </p:tgtEl>
+                                        <p:attrNameLst>
+                                          <p:attrName>style.visibility</p:attrName>
+                                        </p:attrNameLst>
+                                      </p:cBhvr>
+                                      <p:to>
+                                        <p:strVal val="visible"/>
+                                      </p:to>
+                                    </p:set>
+                                  </p:childTnLst>
+                                </p:cTn>
+                              </p:par>
+                            </p:childTnLst>
+                          </p:cTn>
+                        </p:par>
+                        <p:par>
+                          <p:cTn id="7" fill="hold">
+                            <p:stCondLst>
+                              <p:cond delay="0"/>
+                            </p:stCondLst>
+                            <p:childTnLst>
+                              <p:par>
+                                <p:cTn id="8" presetID="10" presetClass="entr" presetSubtype="0" fill="hold" nodeType="afterEffect">
+                                  <p:stCondLst>
+                                    <p:cond delay="0"/>
+                                  </p:stCondLst>
+                                  <p:childTnLst>
+                                    <p:set>
+                                      <p:cBhvr>
+                                        <p:cTn id="9" dur="1" fill="hold">
+                                          <p:stCondLst>
+                                            <p:cond delay="0"/>
+                                          </p:stCondLst>
+                                        </p:cTn>
+                                        <p:tgtEl>
+                                          <p:spTgt spid="1026"/>
+                                        </p:tgtEl>
+                                        <p:attrNameLst>
+                                          <p:attrName>style.visibility</p:attrName>
+                                        </p:attrNameLst>
+                                      </p:cBhvr>
+                                      <p:to>
+                                        <p:strVal val="visible"/>
+                                      </p:to>
+                                    </p:set>
+                                    <p:animEffect transition="in" filter="fade">
+                                      <p:cBhvr>
+                                        <p:cTn id="10" dur="600"/>
+                                        <p:tgtEl>
+                                          <p:spTgt spid="1026"/>
+                                        </p:tgtEl>
+                                      </p:cBhvr>
+                                    </p:animEffect>
+                                  </p:childTnLst>
+                                </p:cTn>
+                              </p:par>
+                            </p:childTnLst>
+                          </p:cTn>
+                        </p:par>
+                        <p:par>
+                          <p:cTn id="11" fill="hold">
+                            <p:stCondLst>
+                              <p:cond delay="600"/>
+                            </p:stCondLst>
+                            <p:childTnLst>
+                              <p:par>
+                                <p:cTn id="12" presetID="10" presetClass="entr" presetSubtype="0" fill="hold" nodeType="afterEffect">
+                                  <p:stCondLst>
+                                    <p:cond delay="0"/>
+                                  </p:stCondLst>
+                                  <p:childTnLst>
+                                    <p:set>
+                                      <p:cBhvr>
+                                        <p:cTn id="13" dur="1" fill="hold">
+                                          <p:stCondLst>
+                                            <p:cond delay="0"/>
+                                          </p:stCondLst>
+                                        </p:cTn>
+                                        <p:tgtEl>
+                                          <p:spTgt spid="1028"/>
+                                        </p:tgtEl>
+                                        <p:attrNameLst>
+                                          <p:attrName>style.visibility</p:attrName>
+                                        </p:attrNameLst>
+                                      </p:cBhvr>
+                                      <p:to>
+                                        <p:strVal val="visible"/>
+                                      </p:to>
+                                    </p:set>
+                                    <p:animEffect transition="in" filter="fade">
+                                      <p:cBhvr>
+                                        <p:cTn id="14" dur="500"/>
+                                        <p:tgtEl>
+                                          <p:spTgt spid="1028"/>
+                                        </p:tgtEl>
+                                      </p:cBhvr>
+                                    </p:animEffect>
+                                  </p:childTnLst>
+                                </p:cTn>
+                              </p:par>
+                            </p:childTnLst>
+                          </p:cTn>
+                        </p:par>
+                        <p:par>
+                          <p:cTn id="15" fill="hold">
+                            <p:stCondLst>
+                              <p:cond delay="1100"/>
+                            </p:stCondLst>
+                            <p:childTnLst>
+                              <p:par>
+                                <p:cTn id="16" presetID="10" presetClass="entr" presetSubtype="0" fill="hold" nodeType="afterEffect">
+                                  <p:stCondLst>
+                                    <p:cond delay="0"/>
+                                  </p:stCondLst>
+                                  <p:childTnLst>
+                                    <p:set>
+                                      <p:cBhvr>
+                                        <p:cTn id="17" dur="1" fill="hold">
+                                          <p:stCondLst>
+                                            <p:cond delay="0"/>
+                                          </p:stCondLst>
+                                        </p:cTn>
+                                        <p:tgtEl>
+                                          <p:spTgt spid="1027"/>
+                                        </p:tgtEl>
+                                        <p:attrNameLst>
+                                          <p:attrName>style.visibility</p:attrName>
+                                        </p:attrNameLst>
+                                      </p:cBhvr>
+                                      <p:to>
+                                        <p:strVal val="visible"/>
+                                      </p:to>
+                                    </p:set>
+                                    <p:animEffect transition="in" filter="fade">
+                                      <p:cBhvr>
+                                        <p:cTn id="18" dur="500"/>
+                                        <p:tgtEl>
+                                          <p:spTgt spid="1027"/>
+                                        </p:tgtEl>
+                                      </p:cBhvr>
+                                    </p:animEffect>
+                                  </p:childTnLst>
+                                </p:cTn>
+                              </p:par>
+                            </p:childTnLst>
+                          </p:cTn>
+                        </p:par>
+                      </p:childTnLst>
+                    </p:cTn>
+                  </p:par>
+                  <p:par>
+                    <p:cTn id="19" fill="hold">
+                      <p:stCondLst>
+                        <p:cond delay="indefinite"/>
+                      </p:stCondLst>
+                      <p:childTnLst>
+                        <p:par>
+                          <p:cTn id="20" fill="hold">
+                            <p:stCondLst>
+                              <p:cond delay="0"/>
+                            </p:stCondLst>
+                            <p:childTnLst>
+                              <p:par>
+                                <p:cTn id="21" presetID="1" presetClass="entr" presetSubtype="0" fill="hold" grpId="0" nodeType="clickEffect">
+                                  <p:stCondLst>
+                                    <p:cond delay="0"/>
+                                  </p:stCondLst>
+                                  <p:childTnLst>
+                                    <p:set>
+                                      <p:cBhvr>
+                                        <p:cTn id="22" dur="1" fill="hold">
+                                          <p:stCondLst>
+                                            <p:cond delay="0"/>
+                                          </p:stCondLst>
+                                        </p:cTn>
+                                        <p:tgtEl>
+                                          <p:spTgt spid="4"/>
+                                        </p:tgtEl>
+                                        <p:attrNameLst>
+                                          <p:attrName>style.visibility</p:attrName>
+                                        </p:attrNameLst>
+                                      </p:cBhvr>
+                                      <p:to>
+                                        <p:strVal val="visible"/>
+                                      </p:to>
+                                    </p:set>
+                                  </p:childTnLst>
+                                </p:cTn>
+                              </p:par>
+                            </p:childTnLst>
+                          </p:cTn>
+                        </p:par>
+                      </p:childTnLst>
+                    </p:cTn>
+                  </p:par>
+                </p:childTnLst>
+              </p:cTn>
+              <p:prevCondLst>
+                <p:cond evt="onPrev" delay="0">
+                  <p:tgtEl>
+                    <p:sldTgt/>
+                  </p:tgtEl>
+                </p:cond>
+              </p:prevCondLst>
+              <p:nextCondLst>
+                <p:cond evt="onNext" delay="0">
+                  <p:tgtEl>
+                    <p:sldTgt/>
+                  </p:tgtEl>
+                </p:cond>
+              </p:nextCondLst>
+            </p:seq>
+          </p:childTnLst>
+        </p:cTn>
       </p:par>
     </p:tnLst>
+    <p:bldLst>
+      <p:bldP spid="3" grpId="0"/>
+      <p:bldP spid="4" grpId="0"/>
+    </p:bldLst>
   </p:timing>
 </p:sld>
 </file>
@@ -4186,7 +4916,7 @@
             <a:pPr algn="l"/>
             <a:r>
               <a:rPr lang="fr-FR" dirty="0" smtClean="0"/>
-              <a:t>Les risques</a:t>
+              <a:t>Application</a:t>
             </a:r>
             <a:endParaRPr lang="fr-FR" dirty="0"/>
           </a:p>
@@ -4200,8 +4930,8 @@
         </p:nvSpPr>
         <p:spPr>
           <a:xfrm>
-            <a:off x="467544" y="1772816"/>
-            <a:ext cx="8280920" cy="3139321"/>
+            <a:off x="866907" y="1703891"/>
+            <a:ext cx="8277093" cy="1292662"/>
           </a:xfrm>
           <a:prstGeom prst="rect">
             <a:avLst/>
@@ -4215,103 +4945,183 @@
           <a:lstStyle/>
           <a:p>
             <a:r>
-              <a:rPr lang="fr-FR" b="1" u="sng" dirty="0" smtClean="0"/>
-              <a:t>L’accès à des informations :</a:t>
-            </a:r>
-          </a:p>
-          <a:p>
-            <a:endParaRPr lang="fr-FR" b="1" dirty="0"/>
-          </a:p>
-          <a:p>
-            <a:pPr>
-              <a:buFont typeface="Arial" pitchFamily="34" charset="0"/>
+              <a:rPr lang="fr-FR" sz="2400" b="1" u="sng" dirty="0" smtClean="0"/>
+              <a:t>Côté serveur</a:t>
+            </a:r>
+            <a:r>
+              <a:rPr lang="fr-FR" sz="2400" b="1" dirty="0" smtClean="0"/>
+              <a:t> : programme PHP</a:t>
+            </a:r>
+          </a:p>
+          <a:p>
+            <a:endParaRPr lang="fr-FR" b="1" u="sng" dirty="0" smtClean="0"/>
+          </a:p>
+          <a:p>
+            <a:pPr marL="285750" indent="-285750">
+              <a:buFont typeface="Arial" panose="020B0604020202020204" pitchFamily="34" charset="0"/>
               <a:buChar char="•"/>
             </a:pPr>
             <a:r>
-              <a:rPr lang="fr-FR" b="1" dirty="0" smtClean="0"/>
-              <a:t>Vol d’informations bancaires</a:t>
-            </a:r>
-          </a:p>
-          <a:p>
-            <a:pPr>
-              <a:buFont typeface="Arial" pitchFamily="34" charset="0"/>
+              <a:rPr lang="fr-FR" dirty="0" smtClean="0"/>
+              <a:t>Le XML envoyé par l’application Android est </a:t>
+            </a:r>
+            <a:r>
+              <a:rPr lang="fr-FR" i="1" dirty="0" err="1" smtClean="0"/>
+              <a:t>parsé</a:t>
+            </a:r>
+            <a:r>
+              <a:rPr lang="fr-FR" i="1" dirty="0" smtClean="0"/>
+              <a:t> </a:t>
+            </a:r>
+            <a:r>
+              <a:rPr lang="fr-FR" dirty="0" smtClean="0"/>
+              <a:t>par le serveur, et la base de données est alors remplie par les informations contenues dans le XML</a:t>
+            </a:r>
+            <a:endParaRPr lang="fr-FR" dirty="0"/>
+          </a:p>
+        </p:txBody>
+      </p:sp>
+      <p:sp>
+        <p:nvSpPr>
+          <p:cNvPr id="4" name="ZoneTexte 3"/>
+          <p:cNvSpPr txBox="1"/>
+          <p:nvPr/>
+        </p:nvSpPr>
+        <p:spPr>
+          <a:xfrm>
+            <a:off x="845381" y="4468480"/>
+            <a:ext cx="7704856" cy="2246769"/>
+          </a:xfrm>
+          <a:prstGeom prst="rect">
+            <a:avLst/>
+          </a:prstGeom>
+          <a:noFill/>
+        </p:spPr>
+        <p:txBody>
+          <a:bodyPr wrap="square" rtlCol="0">
+            <a:spAutoFit/>
+          </a:bodyPr>
+          <a:lstStyle/>
+          <a:p>
+            <a:pPr marL="285750" indent="-285750">
+              <a:buFont typeface="Arial" panose="020B0604020202020204" pitchFamily="34" charset="0"/>
               <a:buChar char="•"/>
             </a:pPr>
-            <a:endParaRPr lang="fr-FR" b="1" dirty="0"/>
-          </a:p>
-          <a:p>
-            <a:pPr>
-              <a:buFont typeface="Arial" pitchFamily="34" charset="0"/>
+            <a:r>
+              <a:rPr lang="fr-FR" dirty="0" smtClean="0"/>
+              <a:t>Un identifiant aléatoire et unique est généré pour un utilisateur, ce qui permet d’obtenir un lien unique pour l’utilisateur, et accessible uniquement par lui-même</a:t>
+            </a:r>
+          </a:p>
+          <a:p>
+            <a:pPr marL="285750" indent="-285750">
+              <a:buFont typeface="Arial" panose="020B0604020202020204" pitchFamily="34" charset="0"/>
               <a:buChar char="•"/>
             </a:pPr>
-            <a:r>
-              <a:rPr lang="fr-FR" b="1" dirty="0" smtClean="0"/>
-              <a:t>Informations privées et personnelles (SMS, Contact, fréquence d’appel…)</a:t>
-            </a:r>
-          </a:p>
-          <a:p>
-            <a:pPr>
-              <a:buFont typeface="Arial" pitchFamily="34" charset="0"/>
+            <a:endParaRPr lang="fr-FR" sz="1400" b="1" dirty="0">
+              <a:latin typeface="Consolas" panose="020B0609020204030204" pitchFamily="49" charset="0"/>
+              <a:cs typeface="Consolas" panose="020B0609020204030204" pitchFamily="49" charset="0"/>
+            </a:endParaRPr>
+          </a:p>
+          <a:p>
+            <a:r>
+              <a:rPr lang="fr-FR" dirty="0">
+                <a:hlinkClick r:id="rId2"/>
+              </a:rPr>
+              <a:t>http://</a:t>
+            </a:r>
+            <a:r>
+              <a:rPr lang="fr-FR" dirty="0" smtClean="0">
+                <a:hlinkClick r:id="rId2"/>
+              </a:rPr>
+              <a:t>uqac.netii.net/show.php?uid=OyoEWQwR9j376X8xCDiuAMKBkmvl2V0s</a:t>
+            </a:r>
+            <a:endParaRPr lang="fr-FR" dirty="0" smtClean="0"/>
+          </a:p>
+          <a:p>
+            <a:endParaRPr lang="fr-FR" dirty="0"/>
+          </a:p>
+          <a:p>
+            <a:pPr marL="285750" indent="-285750">
+              <a:buFont typeface="Arial" panose="020B0604020202020204" pitchFamily="34" charset="0"/>
               <a:buChar char="•"/>
             </a:pPr>
-            <a:endParaRPr lang="fr-FR" b="1" dirty="0"/>
-          </a:p>
-          <a:p>
-            <a:pPr>
-              <a:buFont typeface="Arial" pitchFamily="34" charset="0"/>
-              <a:buChar char="•"/>
-            </a:pPr>
-            <a:r>
-              <a:rPr lang="fr-FR" b="1" dirty="0" smtClean="0"/>
-              <a:t>Etude de l’utilisateur et de </a:t>
-            </a:r>
-            <a:r>
-              <a:rPr lang="fr-FR" b="1" dirty="0"/>
-              <a:t>s</a:t>
-            </a:r>
-            <a:r>
-              <a:rPr lang="fr-FR" b="1" dirty="0" smtClean="0"/>
-              <a:t>es habitudes (SMS, URL …)</a:t>
-            </a:r>
-          </a:p>
-          <a:p>
-            <a:pPr>
-              <a:buFont typeface="Arial" pitchFamily="34" charset="0"/>
-              <a:buChar char="•"/>
-            </a:pPr>
-            <a:endParaRPr lang="fr-FR" b="1" dirty="0"/>
-          </a:p>
-          <a:p>
-            <a:pPr>
-              <a:buFont typeface="Arial" pitchFamily="34" charset="0"/>
-              <a:buChar char="•"/>
-            </a:pPr>
-            <a:r>
-              <a:rPr lang="fr-FR" b="1" dirty="0" smtClean="0"/>
-              <a:t>Ecoute et espionnage (mise en marche du téléphone, prise de photo…)</a:t>
-            </a:r>
-          </a:p>
-          <a:p>
-            <a:pPr>
-              <a:buFont typeface="Arial" pitchFamily="34" charset="0"/>
-              <a:buChar char="•"/>
-            </a:pPr>
-            <a:endParaRPr lang="fr-FR" b="1" dirty="0"/>
-          </a:p>
-          <a:p>
-            <a:pPr>
-              <a:buFont typeface="Arial" pitchFamily="34" charset="0"/>
-              <a:buChar char="•"/>
-            </a:pPr>
-            <a:r>
-              <a:rPr lang="fr-FR" b="1" dirty="0" smtClean="0"/>
-              <a:t>Harcèlement </a:t>
-            </a:r>
-            <a:endParaRPr lang="fr-FR" b="1" dirty="0"/>
+            <a:r>
+              <a:rPr lang="fr-FR" dirty="0" smtClean="0"/>
+              <a:t>Ce lien est renvoyé par le serveur au client ; ce dernier peut alors l’afficher graphiquement dans l’application Android</a:t>
+            </a:r>
+            <a:endParaRPr lang="fr-FR" dirty="0"/>
           </a:p>
         </p:txBody>
       </p:sp>
+      <p:pic>
+        <p:nvPicPr>
+          <p:cNvPr id="2050" name="Picture 2"/>
+          <p:cNvPicPr>
+            <a:picLocks noChangeAspect="1" noChangeArrowheads="1"/>
+          </p:cNvPicPr>
+          <p:nvPr/>
+        </p:nvPicPr>
+        <p:blipFill>
+          <a:blip r:embed="rId3">
+            <a:extLst>
+              <a:ext uri="{BEBA8EAE-BF5A-486C-A8C5-ECC9F3942E4B}">
+                <a14:imgProps xmlns:a14="http://schemas.microsoft.com/office/drawing/2010/main">
+                  <a14:imgLayer r:embed="rId4">
+                    <a14:imgEffect>
+                      <a14:brightnessContrast bright="20000"/>
+                    </a14:imgEffect>
+                  </a14:imgLayer>
+                </a14:imgProps>
+              </a:ext>
+              <a:ext uri="{28A0092B-C50C-407E-A947-70E740481C1C}">
+                <a14:useLocalDpi xmlns:a14="http://schemas.microsoft.com/office/drawing/2010/main" val="0"/>
+              </a:ext>
+            </a:extLst>
+          </a:blip>
+          <a:srcRect/>
+          <a:stretch>
+            <a:fillRect/>
+          </a:stretch>
+        </p:blipFill>
+        <p:spPr bwMode="auto">
+          <a:xfrm>
+            <a:off x="2267744" y="2996553"/>
+            <a:ext cx="3960440" cy="1236381"/>
+          </a:xfrm>
+          <a:prstGeom prst="rect">
+            <a:avLst/>
+          </a:prstGeom>
+          <a:noFill/>
+          <a:ln>
+            <a:noFill/>
+          </a:ln>
+          <a:extLst>
+            <a:ext uri="{909E8E84-426E-40DD-AFC4-6F175D3DCCD1}">
+              <a14:hiddenFill xmlns:a14="http://schemas.microsoft.com/office/drawing/2010/main">
+                <a:solidFill>
+                  <a:schemeClr val="accent1"/>
+                </a:solidFill>
+              </a14:hiddenFill>
+            </a:ext>
+            <a:ext uri="{91240B29-F687-4F45-9708-019B960494DF}">
+              <a14:hiddenLine xmlns:a14="http://schemas.microsoft.com/office/drawing/2010/main" w="9525">
+                <a:solidFill>
+                  <a:schemeClr val="tx1"/>
+                </a:solidFill>
+                <a:miter lim="800000"/>
+                <a:headEnd/>
+                <a:tailEnd/>
+              </a14:hiddenLine>
+            </a:ext>
+          </a:extLst>
+        </p:spPr>
+      </p:pic>
     </p:spTree>
+    <p:extLst>
+      <p:ext uri="{BB962C8B-B14F-4D97-AF65-F5344CB8AC3E}">
+        <p14:creationId xmlns:p14="http://schemas.microsoft.com/office/powerpoint/2010/main" val="431168526"/>
+      </p:ext>
+    </p:extLst>
   </p:cSld>
   <p:clrMapOvr>
     <a:masterClrMapping/>
@@ -4320,9 +5130,153 @@
   <p:timing>
     <p:tnLst>
       <p:par>
-        <p:cTn id="1" dur="indefinite" restart="never" nodeType="tmRoot"/>
+        <p:cTn id="1" dur="indefinite" restart="never" nodeType="tmRoot">
+          <p:childTnLst>
+            <p:seq concurrent="1" nextAc="seek">
+              <p:cTn id="2" dur="indefinite" nodeType="mainSeq">
+                <p:childTnLst>
+                  <p:par>
+                    <p:cTn id="3" fill="hold">
+                      <p:stCondLst>
+                        <p:cond delay="indefinite"/>
+                      </p:stCondLst>
+                      <p:childTnLst>
+                        <p:par>
+                          <p:cTn id="4" fill="hold">
+                            <p:stCondLst>
+                              <p:cond delay="0"/>
+                            </p:stCondLst>
+                            <p:childTnLst>
+                              <p:par>
+                                <p:cTn id="5" presetID="1" presetClass="entr" presetSubtype="0" fill="hold" grpId="0" nodeType="clickEffect">
+                                  <p:stCondLst>
+                                    <p:cond delay="0"/>
+                                  </p:stCondLst>
+                                  <p:childTnLst>
+                                    <p:set>
+                                      <p:cBhvr>
+                                        <p:cTn id="6" dur="1" fill="hold">
+                                          <p:stCondLst>
+                                            <p:cond delay="0"/>
+                                          </p:stCondLst>
+                                        </p:cTn>
+                                        <p:tgtEl>
+                                          <p:spTgt spid="3"/>
+                                        </p:tgtEl>
+                                        <p:attrNameLst>
+                                          <p:attrName>style.visibility</p:attrName>
+                                        </p:attrNameLst>
+                                      </p:cBhvr>
+                                      <p:to>
+                                        <p:strVal val="visible"/>
+                                      </p:to>
+                                    </p:set>
+                                  </p:childTnLst>
+                                </p:cTn>
+                              </p:par>
+                              <p:par>
+                                <p:cTn id="7" presetID="1" presetClass="entr" presetSubtype="0" fill="hold" nodeType="withEffect">
+                                  <p:stCondLst>
+                                    <p:cond delay="0"/>
+                                  </p:stCondLst>
+                                  <p:childTnLst>
+                                    <p:set>
+                                      <p:cBhvr>
+                                        <p:cTn id="8" dur="1" fill="hold">
+                                          <p:stCondLst>
+                                            <p:cond delay="0"/>
+                                          </p:stCondLst>
+                                        </p:cTn>
+                                        <p:tgtEl>
+                                          <p:spTgt spid="2050"/>
+                                        </p:tgtEl>
+                                        <p:attrNameLst>
+                                          <p:attrName>style.visibility</p:attrName>
+                                        </p:attrNameLst>
+                                      </p:cBhvr>
+                                      <p:to>
+                                        <p:strVal val="visible"/>
+                                      </p:to>
+                                    </p:set>
+                                  </p:childTnLst>
+                                </p:cTn>
+                              </p:par>
+                            </p:childTnLst>
+                          </p:cTn>
+                        </p:par>
+                      </p:childTnLst>
+                    </p:cTn>
+                  </p:par>
+                  <p:par>
+                    <p:cTn id="9" fill="hold">
+                      <p:stCondLst>
+                        <p:cond delay="indefinite"/>
+                      </p:stCondLst>
+                      <p:childTnLst>
+                        <p:par>
+                          <p:cTn id="10" fill="hold">
+                            <p:stCondLst>
+                              <p:cond delay="0"/>
+                            </p:stCondLst>
+                            <p:childTnLst>
+                              <p:par>
+                                <p:cTn id="11" presetID="1" presetClass="entr" presetSubtype="0" fill="hold" grpId="0" nodeType="clickEffect">
+                                  <p:stCondLst>
+                                    <p:cond delay="0"/>
+                                  </p:stCondLst>
+                                  <p:childTnLst>
+                                    <p:set>
+                                      <p:cBhvr>
+                                        <p:cTn id="12" dur="1" fill="hold">
+                                          <p:stCondLst>
+                                            <p:cond delay="0"/>
+                                          </p:stCondLst>
+                                        </p:cTn>
+                                        <p:tgtEl>
+                                          <p:spTgt spid="4"/>
+                                        </p:tgtEl>
+                                        <p:attrNameLst>
+                                          <p:attrName>style.visibility</p:attrName>
+                                        </p:attrNameLst>
+                                      </p:cBhvr>
+                                      <p:to>
+                                        <p:strVal val="visible"/>
+                                      </p:to>
+                                    </p:set>
+                                  </p:childTnLst>
+                                </p:cTn>
+                              </p:par>
+                            </p:childTnLst>
+                          </p:cTn>
+                        </p:par>
+                      </p:childTnLst>
+                    </p:cTn>
+                  </p:par>
+                </p:childTnLst>
+              </p:cTn>
+              <p:prevCondLst>
+                <p:cond evt="onPrev" delay="0">
+                  <p:tgtEl>
+                    <p:sldTgt/>
+                  </p:tgtEl>
+                </p:cond>
+              </p:prevCondLst>
+              <p:nextCondLst>
+                <p:cond evt="onNext" delay="0">
+                  <p:tgtEl>
+                    <p:sldTgt/>
+                  </p:tgtEl>
+                </p:cond>
+              </p:nextCondLst>
+            </p:seq>
+          </p:childTnLst>
+        </p:cTn>
       </p:par>
     </p:tnLst>
+    <p:bldLst>
+      <p:bldP spid="3" grpId="0"/>
+      <p:bldP spid="4" grpId="0"/>
+    </p:bldLst>
   </p:timing>
 </p:sld>
 </file>
@@ -4395,8 +5349,8 @@
         </p:nvSpPr>
         <p:spPr>
           <a:xfrm>
-            <a:off x="467544" y="1844824"/>
-            <a:ext cx="8280920" cy="3139321"/>
+            <a:off x="467544" y="1772816"/>
+            <a:ext cx="8280920" cy="5016758"/>
           </a:xfrm>
           <a:prstGeom prst="rect">
             <a:avLst/>
@@ -4410,66 +5364,46 @@
           <a:lstStyle/>
           <a:p>
             <a:r>
-              <a:rPr lang="fr-FR" b="1" u="sng" dirty="0" smtClean="0"/>
-              <a:t>Création de fausses </a:t>
-            </a:r>
-            <a:r>
-              <a:rPr lang="fr-FR" b="1" u="sng" dirty="0" err="1" smtClean="0"/>
-              <a:t>identitées</a:t>
-            </a:r>
-            <a:r>
-              <a:rPr lang="fr-FR" b="1" u="sng" dirty="0" smtClean="0"/>
-              <a:t> :</a:t>
-            </a:r>
+              <a:rPr lang="fr-FR" sz="3200" b="1" u="sng" dirty="0" smtClean="0"/>
+              <a:t>L’accès à des informations :</a:t>
+            </a:r>
+          </a:p>
+          <a:p>
+            <a:endParaRPr lang="fr-FR" sz="2400" b="1" dirty="0"/>
           </a:p>
           <a:p>
             <a:pPr>
               <a:buFont typeface="Arial" pitchFamily="34" charset="0"/>
               <a:buChar char="•"/>
             </a:pPr>
-            <a:endParaRPr lang="fr-FR" b="1" dirty="0"/>
+            <a:r>
+              <a:rPr lang="fr-FR" sz="2400" b="1" dirty="0" smtClean="0"/>
+              <a:t>Vol d’informations bancaires</a:t>
+            </a:r>
           </a:p>
           <a:p>
             <a:pPr>
               <a:buFont typeface="Arial" pitchFamily="34" charset="0"/>
               <a:buChar char="•"/>
             </a:pPr>
-            <a:r>
-              <a:rPr lang="fr-FR" dirty="0" smtClean="0"/>
-              <a:t>Avec certaines permissions, on peut créer un contact factice (nom, numéro, adresse…)</a:t>
-            </a:r>
+            <a:endParaRPr lang="fr-FR" sz="2400" b="1" dirty="0"/>
           </a:p>
           <a:p>
             <a:pPr>
               <a:buFont typeface="Arial" pitchFamily="34" charset="0"/>
               <a:buChar char="•"/>
             </a:pPr>
-            <a:endParaRPr lang="fr-FR" dirty="0" smtClean="0">
-              <a:sym typeface="Wingdings" pitchFamily="2" charset="2"/>
-            </a:endParaRPr>
+            <a:r>
+              <a:rPr lang="fr-FR" sz="2400" b="1" dirty="0" smtClean="0"/>
+              <a:t>Informations privées et personnelles (SMS, Contact, fréquence d’appel…)</a:t>
+            </a:r>
           </a:p>
           <a:p>
             <a:pPr>
               <a:buFont typeface="Arial" pitchFamily="34" charset="0"/>
               <a:buChar char="•"/>
             </a:pPr>
-            <a:r>
-              <a:rPr lang="fr-FR" dirty="0" smtClean="0">
-                <a:sym typeface="Wingdings" pitchFamily="2" charset="2"/>
-              </a:rPr>
-              <a:t>Possibilités de créer des conversations avec ce contact sans jamais avoir reçu un SMS</a:t>
-            </a:r>
-            <a:r>
-              <a:rPr lang="fr-FR" dirty="0" smtClean="0"/>
-              <a:t> </a:t>
-            </a:r>
-          </a:p>
-          <a:p>
-            <a:pPr>
-              <a:buFont typeface="Wingdings"/>
-              <a:buChar char="à"/>
-            </a:pPr>
-            <a:endParaRPr lang="fr-FR" dirty="0"/>
+            <a:endParaRPr lang="fr-FR" sz="2400" b="1" dirty="0"/>
           </a:p>
           <a:p>
             <a:pPr>
@@ -4477,33 +5411,24 @@
               <a:buChar char="•"/>
             </a:pPr>
             <a:r>
-              <a:rPr lang="fr-FR" dirty="0" smtClean="0"/>
-              <a:t>Intrusion dans la sphère privée de l’utilisateur</a:t>
-            </a:r>
-          </a:p>
-          <a:p>
-            <a:pPr>
-              <a:buFont typeface="Wingdings"/>
-              <a:buChar char="à"/>
-            </a:pPr>
-            <a:endParaRPr lang="fr-FR" dirty="0"/>
+              <a:rPr lang="fr-FR" sz="2400" b="1" dirty="0" smtClean="0"/>
+              <a:t>Etude de l’utilisateur et de </a:t>
+            </a:r>
+            <a:r>
+              <a:rPr lang="fr-FR" sz="2400" b="1" dirty="0"/>
+              <a:t>s</a:t>
+            </a:r>
+            <a:r>
+              <a:rPr lang="fr-FR" sz="2400" b="1" dirty="0" smtClean="0"/>
+              <a:t>es habitudes (SMS, URL …)</a:t>
+            </a:r>
           </a:p>
           <a:p>
             <a:pPr>
               <a:buFont typeface="Arial" pitchFamily="34" charset="0"/>
               <a:buChar char="•"/>
             </a:pPr>
-            <a:r>
-              <a:rPr lang="fr-FR" dirty="0" smtClean="0"/>
-              <a:t>Abus de confiance (envoi de liens publicitaire par SMS)</a:t>
-            </a:r>
-          </a:p>
-          <a:p>
-            <a:pPr>
-              <a:buFont typeface="Wingdings"/>
-              <a:buChar char="à"/>
-            </a:pPr>
-            <a:endParaRPr lang="fr-FR" dirty="0"/>
+            <a:endParaRPr lang="fr-FR" sz="2400" b="1" dirty="0"/>
           </a:p>
           <a:p>
             <a:pPr>
@@ -4511,10 +5436,27 @@
               <a:buChar char="•"/>
             </a:pPr>
             <a:r>
-              <a:rPr lang="fr-FR" dirty="0" smtClean="0"/>
-              <a:t>Possibilité d’envoyer des emails de la part d’un des contacts à l’utilisateur</a:t>
-            </a:r>
-            <a:endParaRPr lang="fr-FR" dirty="0"/>
+              <a:rPr lang="fr-FR" sz="2400" b="1" dirty="0" smtClean="0"/>
+              <a:t>Ecoute et espionnage (mise en marche du téléphone, prise de photo…)</a:t>
+            </a:r>
+          </a:p>
+          <a:p>
+            <a:pPr>
+              <a:buFont typeface="Arial" pitchFamily="34" charset="0"/>
+              <a:buChar char="•"/>
+            </a:pPr>
+            <a:endParaRPr lang="fr-FR" sz="2400" b="1" dirty="0"/>
+          </a:p>
+          <a:p>
+            <a:pPr>
+              <a:buFont typeface="Arial" pitchFamily="34" charset="0"/>
+              <a:buChar char="•"/>
+            </a:pPr>
+            <a:r>
+              <a:rPr lang="fr-FR" sz="2400" b="1" dirty="0" smtClean="0"/>
+              <a:t>Harcèlement </a:t>
+            </a:r>
+            <a:endParaRPr lang="fr-FR" sz="2400" b="1" dirty="0"/>
           </a:p>
         </p:txBody>
       </p:sp>
@@ -4527,7 +5469,396 @@
   <p:timing>
     <p:tnLst>
       <p:par>
-        <p:cTn id="1" dur="indefinite" restart="never" nodeType="tmRoot"/>
+        <p:cTn id="1" dur="indefinite" restart="never" nodeType="tmRoot">
+          <p:childTnLst>
+            <p:seq concurrent="1" nextAc="seek">
+              <p:cTn id="2" dur="indefinite" nodeType="mainSeq">
+                <p:childTnLst>
+                  <p:par>
+                    <p:cTn id="3" fill="hold">
+                      <p:stCondLst>
+                        <p:cond delay="indefinite"/>
+                      </p:stCondLst>
+                      <p:childTnLst>
+                        <p:par>
+                          <p:cTn id="4" fill="hold">
+                            <p:stCondLst>
+                              <p:cond delay="0"/>
+                            </p:stCondLst>
+                            <p:childTnLst>
+                              <p:par>
+                                <p:cTn id="5" presetID="10" presetClass="entr" presetSubtype="0" fill="hold" nodeType="clickEffect">
+                                  <p:stCondLst>
+                                    <p:cond delay="0"/>
+                                  </p:stCondLst>
+                                  <p:childTnLst>
+                                    <p:set>
+                                      <p:cBhvr>
+                                        <p:cTn id="6" dur="1" fill="hold">
+                                          <p:stCondLst>
+                                            <p:cond delay="0"/>
+                                          </p:stCondLst>
+                                        </p:cTn>
+                                        <p:tgtEl>
+                                          <p:spTgt spid="3">
+                                            <p:txEl>
+                                              <p:pRg st="0" end="0"/>
+                                            </p:txEl>
+                                          </p:spTgt>
+                                        </p:tgtEl>
+                                        <p:attrNameLst>
+                                          <p:attrName>style.visibility</p:attrName>
+                                        </p:attrNameLst>
+                                      </p:cBhvr>
+                                      <p:to>
+                                        <p:strVal val="visible"/>
+                                      </p:to>
+                                    </p:set>
+                                    <p:animEffect transition="in" filter="fade">
+                                      <p:cBhvr>
+                                        <p:cTn id="7" dur="500"/>
+                                        <p:tgtEl>
+                                          <p:spTgt spid="3">
+                                            <p:txEl>
+                                              <p:pRg st="0" end="0"/>
+                                            </p:txEl>
+                                          </p:spTgt>
+                                        </p:tgtEl>
+                                      </p:cBhvr>
+                                    </p:animEffect>
+                                  </p:childTnLst>
+                                </p:cTn>
+                              </p:par>
+                            </p:childTnLst>
+                          </p:cTn>
+                        </p:par>
+                      </p:childTnLst>
+                    </p:cTn>
+                  </p:par>
+                  <p:par>
+                    <p:cTn id="8" fill="hold">
+                      <p:stCondLst>
+                        <p:cond delay="indefinite"/>
+                      </p:stCondLst>
+                      <p:childTnLst>
+                        <p:par>
+                          <p:cTn id="9" fill="hold">
+                            <p:stCondLst>
+                              <p:cond delay="0"/>
+                            </p:stCondLst>
+                            <p:childTnLst>
+                              <p:par>
+                                <p:cTn id="10" presetID="10" presetClass="entr" presetSubtype="0" fill="hold" nodeType="clickEffect">
+                                  <p:stCondLst>
+                                    <p:cond delay="0"/>
+                                  </p:stCondLst>
+                                  <p:childTnLst>
+                                    <p:set>
+                                      <p:cBhvr>
+                                        <p:cTn id="11" dur="1" fill="hold">
+                                          <p:stCondLst>
+                                            <p:cond delay="0"/>
+                                          </p:stCondLst>
+                                        </p:cTn>
+                                        <p:tgtEl>
+                                          <p:spTgt spid="3">
+                                            <p:txEl>
+                                              <p:pRg st="2" end="2"/>
+                                            </p:txEl>
+                                          </p:spTgt>
+                                        </p:tgtEl>
+                                        <p:attrNameLst>
+                                          <p:attrName>style.visibility</p:attrName>
+                                        </p:attrNameLst>
+                                      </p:cBhvr>
+                                      <p:to>
+                                        <p:strVal val="visible"/>
+                                      </p:to>
+                                    </p:set>
+                                    <p:animEffect transition="in" filter="fade">
+                                      <p:cBhvr>
+                                        <p:cTn id="12" dur="500"/>
+                                        <p:tgtEl>
+                                          <p:spTgt spid="3">
+                                            <p:txEl>
+                                              <p:pRg st="2" end="2"/>
+                                            </p:txEl>
+                                          </p:spTgt>
+                                        </p:tgtEl>
+                                      </p:cBhvr>
+                                    </p:animEffect>
+                                  </p:childTnLst>
+                                </p:cTn>
+                              </p:par>
+                            </p:childTnLst>
+                          </p:cTn>
+                        </p:par>
+                      </p:childTnLst>
+                    </p:cTn>
+                  </p:par>
+                  <p:par>
+                    <p:cTn id="13" fill="hold">
+                      <p:stCondLst>
+                        <p:cond delay="indefinite"/>
+                      </p:stCondLst>
+                      <p:childTnLst>
+                        <p:par>
+                          <p:cTn id="14" fill="hold">
+                            <p:stCondLst>
+                              <p:cond delay="0"/>
+                            </p:stCondLst>
+                            <p:childTnLst>
+                              <p:par>
+                                <p:cTn id="15" presetID="10" presetClass="entr" presetSubtype="0" fill="hold" nodeType="clickEffect">
+                                  <p:stCondLst>
+                                    <p:cond delay="0"/>
+                                  </p:stCondLst>
+                                  <p:childTnLst>
+                                    <p:set>
+                                      <p:cBhvr>
+                                        <p:cTn id="16" dur="1" fill="hold">
+                                          <p:stCondLst>
+                                            <p:cond delay="0"/>
+                                          </p:stCondLst>
+                                        </p:cTn>
+                                        <p:tgtEl>
+                                          <p:spTgt spid="3">
+                                            <p:txEl>
+                                              <p:pRg st="4" end="4"/>
+                                            </p:txEl>
+                                          </p:spTgt>
+                                        </p:tgtEl>
+                                        <p:attrNameLst>
+                                          <p:attrName>style.visibility</p:attrName>
+                                        </p:attrNameLst>
+                                      </p:cBhvr>
+                                      <p:to>
+                                        <p:strVal val="visible"/>
+                                      </p:to>
+                                    </p:set>
+                                    <p:animEffect transition="in" filter="fade">
+                                      <p:cBhvr>
+                                        <p:cTn id="17" dur="500"/>
+                                        <p:tgtEl>
+                                          <p:spTgt spid="3">
+                                            <p:txEl>
+                                              <p:pRg st="4" end="4"/>
+                                            </p:txEl>
+                                          </p:spTgt>
+                                        </p:tgtEl>
+                                      </p:cBhvr>
+                                    </p:animEffect>
+                                  </p:childTnLst>
+                                </p:cTn>
+                              </p:par>
+                            </p:childTnLst>
+                          </p:cTn>
+                        </p:par>
+                      </p:childTnLst>
+                    </p:cTn>
+                  </p:par>
+                  <p:par>
+                    <p:cTn id="18" fill="hold">
+                      <p:stCondLst>
+                        <p:cond delay="indefinite"/>
+                      </p:stCondLst>
+                      <p:childTnLst>
+                        <p:par>
+                          <p:cTn id="19" fill="hold">
+                            <p:stCondLst>
+                              <p:cond delay="0"/>
+                            </p:stCondLst>
+                            <p:childTnLst>
+                              <p:par>
+                                <p:cTn id="20" presetID="10" presetClass="entr" presetSubtype="0" fill="hold" nodeType="clickEffect">
+                                  <p:stCondLst>
+                                    <p:cond delay="0"/>
+                                  </p:stCondLst>
+                                  <p:childTnLst>
+                                    <p:set>
+                                      <p:cBhvr>
+                                        <p:cTn id="21" dur="1" fill="hold">
+                                          <p:stCondLst>
+                                            <p:cond delay="0"/>
+                                          </p:stCondLst>
+                                        </p:cTn>
+                                        <p:tgtEl>
+                                          <p:spTgt spid="3">
+                                            <p:txEl>
+                                              <p:pRg st="6" end="6"/>
+                                            </p:txEl>
+                                          </p:spTgt>
+                                        </p:tgtEl>
+                                        <p:attrNameLst>
+                                          <p:attrName>style.visibility</p:attrName>
+                                        </p:attrNameLst>
+                                      </p:cBhvr>
+                                      <p:to>
+                                        <p:strVal val="visible"/>
+                                      </p:to>
+                                    </p:set>
+                                    <p:animEffect transition="in" filter="fade">
+                                      <p:cBhvr>
+                                        <p:cTn id="22" dur="500"/>
+                                        <p:tgtEl>
+                                          <p:spTgt spid="3">
+                                            <p:txEl>
+                                              <p:pRg st="6" end="6"/>
+                                            </p:txEl>
+                                          </p:spTgt>
+                                        </p:tgtEl>
+                                      </p:cBhvr>
+                                    </p:animEffect>
+                                  </p:childTnLst>
+                                </p:cTn>
+                              </p:par>
+                            </p:childTnLst>
+                          </p:cTn>
+                        </p:par>
+                      </p:childTnLst>
+                    </p:cTn>
+                  </p:par>
+                  <p:par>
+                    <p:cTn id="23" fill="hold">
+                      <p:stCondLst>
+                        <p:cond delay="indefinite"/>
+                      </p:stCondLst>
+                      <p:childTnLst>
+                        <p:par>
+                          <p:cTn id="24" fill="hold">
+                            <p:stCondLst>
+                              <p:cond delay="0"/>
+                            </p:stCondLst>
+                            <p:childTnLst>
+                              <p:par>
+                                <p:cTn id="25" presetID="10" presetClass="entr" presetSubtype="0" fill="hold" nodeType="clickEffect">
+                                  <p:stCondLst>
+                                    <p:cond delay="0"/>
+                                  </p:stCondLst>
+                                  <p:childTnLst>
+                                    <p:set>
+                                      <p:cBhvr>
+                                        <p:cTn id="26" dur="1" fill="hold">
+                                          <p:stCondLst>
+                                            <p:cond delay="0"/>
+                                          </p:stCondLst>
+                                        </p:cTn>
+                                        <p:tgtEl>
+                                          <p:spTgt spid="3">
+                                            <p:txEl>
+                                              <p:pRg st="8" end="8"/>
+                                            </p:txEl>
+                                          </p:spTgt>
+                                        </p:tgtEl>
+                                        <p:attrNameLst>
+                                          <p:attrName>style.visibility</p:attrName>
+                                        </p:attrNameLst>
+                                      </p:cBhvr>
+                                      <p:to>
+                                        <p:strVal val="visible"/>
+                                      </p:to>
+                                    </p:set>
+                                    <p:animEffect transition="in" filter="fade">
+                                      <p:cBhvr>
+                                        <p:cTn id="27" dur="500"/>
+                                        <p:tgtEl>
+                                          <p:spTgt spid="3">
+                                            <p:txEl>
+                                              <p:pRg st="8" end="8"/>
+                                            </p:txEl>
+                                          </p:spTgt>
+                                        </p:tgtEl>
+                                      </p:cBhvr>
+                                    </p:animEffect>
+                                  </p:childTnLst>
+                                </p:cTn>
+                              </p:par>
+                            </p:childTnLst>
+                          </p:cTn>
+                        </p:par>
+                      </p:childTnLst>
+                    </p:cTn>
+                  </p:par>
+                  <p:par>
+                    <p:cTn id="28" fill="hold">
+                      <p:stCondLst>
+                        <p:cond delay="indefinite"/>
+                      </p:stCondLst>
+                      <p:childTnLst>
+                        <p:par>
+                          <p:cTn id="29" fill="hold">
+                            <p:stCondLst>
+                              <p:cond delay="0"/>
+                            </p:stCondLst>
+                            <p:childTnLst>
+                              <p:par>
+                                <p:cTn id="30" presetID="10" presetClass="entr" presetSubtype="0" fill="hold" nodeType="clickEffect">
+                                  <p:stCondLst>
+                                    <p:cond delay="0"/>
+                                  </p:stCondLst>
+                                  <p:childTnLst>
+                                    <p:set>
+                                      <p:cBhvr>
+                                        <p:cTn id="31" dur="1" fill="hold">
+                                          <p:stCondLst>
+                                            <p:cond delay="0"/>
+                                          </p:stCondLst>
+                                        </p:cTn>
+                                        <p:tgtEl>
+                                          <p:spTgt spid="3">
+                                            <p:txEl>
+                                              <p:pRg st="10" end="10"/>
+                                            </p:txEl>
+                                          </p:spTgt>
+                                        </p:tgtEl>
+                                        <p:attrNameLst>
+                                          <p:attrName>style.visibility</p:attrName>
+                                        </p:attrNameLst>
+                                      </p:cBhvr>
+                                      <p:to>
+                                        <p:strVal val="visible"/>
+                                      </p:to>
+                                    </p:set>
+                                    <p:animEffect transition="in" filter="fade">
+                                      <p:cBhvr>
+                                        <p:cTn id="32" dur="500"/>
+                                        <p:tgtEl>
+                                          <p:spTgt spid="3">
+                                            <p:txEl>
+                                              <p:pRg st="10" end="10"/>
+                                            </p:txEl>
+                                          </p:spTgt>
+                                        </p:tgtEl>
+                                      </p:cBhvr>
+                                    </p:animEffect>
+                                  </p:childTnLst>
+                                </p:cTn>
+                              </p:par>
+                            </p:childTnLst>
+                          </p:cTn>
+                        </p:par>
+                      </p:childTnLst>
+                    </p:cTn>
+                  </p:par>
+                </p:childTnLst>
+              </p:cTn>
+              <p:prevCondLst>
+                <p:cond evt="onPrev" delay="0">
+                  <p:tgtEl>
+                    <p:sldTgt/>
+                  </p:tgtEl>
+                </p:cond>
+              </p:prevCondLst>
+              <p:nextCondLst>
+                <p:cond evt="onNext" delay="0">
+                  <p:tgtEl>
+                    <p:sldTgt/>
+                  </p:tgtEl>
+                </p:cond>
+              </p:nextCondLst>
+            </p:seq>
+          </p:childTnLst>
+        </p:cTn>
       </p:par>
     </p:tnLst>
   </p:timing>
@@ -4588,7 +5919,7 @@
             <a:pPr algn="l"/>
             <a:r>
               <a:rPr lang="fr-FR" dirty="0" smtClean="0"/>
-              <a:t>Comparaison IOS et Windows Phone</a:t>
+              <a:t>Les risques</a:t>
             </a:r>
             <a:endParaRPr lang="fr-FR" dirty="0"/>
           </a:p>
@@ -4596,14 +5927,14 @@
       </p:sp>
       <p:sp>
         <p:nvSpPr>
-          <p:cNvPr id="4" name="ZoneTexte 3"/>
+          <p:cNvPr id="3" name="ZoneTexte 2"/>
           <p:cNvSpPr txBox="1"/>
           <p:nvPr/>
         </p:nvSpPr>
         <p:spPr>
           <a:xfrm>
-            <a:off x="827584" y="1772816"/>
-            <a:ext cx="8316416" cy="1477328"/>
+            <a:off x="438169" y="1624900"/>
+            <a:ext cx="8280920" cy="5324535"/>
           </a:xfrm>
           <a:prstGeom prst="rect">
             <a:avLst/>
@@ -4617,88 +5948,43 @@
           <a:lstStyle/>
           <a:p>
             <a:r>
-              <a:rPr lang="fr-FR" b="1" u="sng" dirty="0" smtClean="0"/>
-              <a:t>Points</a:t>
-            </a:r>
-            <a:r>
-              <a:rPr lang="fr-FR" u="sng" dirty="0" smtClean="0"/>
-              <a:t> </a:t>
-            </a:r>
-            <a:r>
-              <a:rPr lang="fr-FR" b="1" u="sng" dirty="0" smtClean="0"/>
-              <a:t>communs</a:t>
-            </a:r>
-            <a:r>
-              <a:rPr lang="fr-FR" u="sng" dirty="0" smtClean="0"/>
-              <a:t> :</a:t>
-            </a:r>
-          </a:p>
-          <a:p>
-            <a:endParaRPr lang="fr-FR" dirty="0"/>
+              <a:rPr lang="fr-FR" sz="2800" b="1" u="sng" dirty="0" smtClean="0"/>
+              <a:t>Création de fausses </a:t>
+            </a:r>
+            <a:r>
+              <a:rPr lang="fr-FR" sz="2800" b="1" u="sng" dirty="0" smtClean="0"/>
+              <a:t>identités </a:t>
+            </a:r>
+            <a:r>
+              <a:rPr lang="fr-FR" sz="2800" b="1" u="sng" dirty="0" smtClean="0"/>
+              <a:t>:</a:t>
+            </a:r>
           </a:p>
           <a:p>
             <a:pPr>
               <a:buFont typeface="Arial" pitchFamily="34" charset="0"/>
               <a:buChar char="•"/>
             </a:pPr>
-            <a:r>
-              <a:rPr lang="fr-FR" dirty="0" smtClean="0"/>
-              <a:t>Même genre de permissions accordées aux applications.</a:t>
-            </a:r>
+            <a:endParaRPr lang="fr-FR" sz="2400" b="1" dirty="0"/>
           </a:p>
           <a:p>
             <a:pPr>
               <a:buFont typeface="Arial" pitchFamily="34" charset="0"/>
               <a:buChar char="•"/>
             </a:pPr>
-            <a:endParaRPr lang="fr-FR" dirty="0"/>
+            <a:r>
+              <a:rPr lang="fr-FR" sz="2400" b="1" dirty="0" smtClean="0"/>
+              <a:t>Avec certaines permissions, on peut créer un contact factice (nom, numéro, adresse…)</a:t>
+            </a:r>
           </a:p>
           <a:p>
             <a:pPr>
               <a:buFont typeface="Arial" pitchFamily="34" charset="0"/>
               <a:buChar char="•"/>
             </a:pPr>
-            <a:r>
-              <a:rPr lang="fr-FR" dirty="0" smtClean="0"/>
-              <a:t>Une fois l’application installée, le vol d’informations est possible sur les 3 plateformes</a:t>
-            </a:r>
-            <a:endParaRPr lang="fr-FR" dirty="0"/>
-          </a:p>
-        </p:txBody>
-      </p:sp>
-      <p:sp>
-        <p:nvSpPr>
-          <p:cNvPr id="5" name="ZoneTexte 4"/>
-          <p:cNvSpPr txBox="1"/>
-          <p:nvPr/>
-        </p:nvSpPr>
-        <p:spPr>
-          <a:xfrm>
-            <a:off x="827584" y="3356992"/>
-            <a:ext cx="7848872" cy="2585323"/>
-          </a:xfrm>
-          <a:prstGeom prst="rect">
-            <a:avLst/>
-          </a:prstGeom>
-          <a:noFill/>
-        </p:spPr>
-        <p:txBody>
-          <a:bodyPr wrap="square" rtlCol="0">
-            <a:spAutoFit/>
-          </a:bodyPr>
-          <a:lstStyle/>
-          <a:p>
-            <a:r>
-              <a:rPr lang="fr-FR" b="1" u="sng" dirty="0" smtClean="0"/>
-              <a:t>Différences</a:t>
-            </a:r>
-            <a:r>
-              <a:rPr lang="fr-FR" u="sng" dirty="0" smtClean="0"/>
-              <a:t> :</a:t>
-            </a:r>
-          </a:p>
-          <a:p>
-            <a:endParaRPr lang="fr-FR" dirty="0"/>
+            <a:endParaRPr lang="fr-FR" sz="2400" b="1" dirty="0" smtClean="0">
+              <a:sym typeface="Wingdings" pitchFamily="2" charset="2"/>
+            </a:endParaRPr>
           </a:p>
           <a:p>
             <a:pPr>
@@ -4706,20 +5992,35 @@
               <a:buChar char="•"/>
             </a:pPr>
             <a:r>
-              <a:rPr lang="fr-FR" dirty="0" err="1" smtClean="0"/>
-              <a:t>Android</a:t>
-            </a:r>
-            <a:r>
-              <a:rPr lang="fr-FR" dirty="0" smtClean="0"/>
-              <a:t> permet à l’utilisateur de savoir les permissions accordées par l’application au téléchargement</a:t>
-            </a:r>
+              <a:rPr lang="fr-FR" sz="2400" b="1" dirty="0" smtClean="0">
+                <a:sym typeface="Wingdings" pitchFamily="2" charset="2"/>
+              </a:rPr>
+              <a:t>Possibilités de créer des conversations avec ce contact sans jamais avoir reçu un SMS</a:t>
+            </a:r>
+            <a:r>
+              <a:rPr lang="fr-FR" sz="2400" b="1" dirty="0" smtClean="0"/>
+              <a:t> </a:t>
+            </a:r>
+          </a:p>
+          <a:p>
+            <a:pPr>
+              <a:buFont typeface="Wingdings"/>
+              <a:buChar char="à"/>
+            </a:pPr>
+            <a:endParaRPr lang="fr-FR" sz="2400" b="1" dirty="0"/>
           </a:p>
           <a:p>
             <a:pPr>
               <a:buFont typeface="Arial" pitchFamily="34" charset="0"/>
               <a:buChar char="•"/>
             </a:pPr>
-            <a:endParaRPr lang="fr-FR" dirty="0"/>
+            <a:r>
+              <a:rPr lang="fr-FR" sz="2400" b="1" dirty="0" smtClean="0"/>
+              <a:t>Intrusion dans la sphère privée de l’utilisateur</a:t>
+            </a:r>
+          </a:p>
+          <a:p>
+            <a:endParaRPr lang="fr-FR" sz="2400" b="1" dirty="0"/>
           </a:p>
           <a:p>
             <a:pPr>
@@ -4727,31 +6028,35 @@
               <a:buChar char="•"/>
             </a:pPr>
             <a:r>
-              <a:rPr lang="fr-FR" dirty="0" smtClean="0"/>
-              <a:t>Les applications IOS et Windows Phone, sont réellement testées et approuvées par des « testeurs » d’Apple ou Microsoft, avant sa mise sur le store.</a:t>
-            </a:r>
+              <a:rPr lang="fr-FR" sz="2400" b="1" dirty="0" smtClean="0"/>
+              <a:t>Abus de confiance (envoi de liens </a:t>
+            </a:r>
+            <a:r>
+              <a:rPr lang="fr-FR" sz="2400" b="1" dirty="0" smtClean="0"/>
+              <a:t>publicitaires </a:t>
+            </a:r>
+            <a:r>
+              <a:rPr lang="fr-FR" sz="2400" b="1" dirty="0" smtClean="0"/>
+              <a:t>par SMS)</a:t>
+            </a:r>
+          </a:p>
+          <a:p>
+            <a:pPr>
+              <a:buFont typeface="Wingdings"/>
+              <a:buChar char="à"/>
+            </a:pPr>
+            <a:endParaRPr lang="fr-FR" sz="2400" b="1" dirty="0"/>
           </a:p>
           <a:p>
             <a:pPr>
               <a:buFont typeface="Arial" pitchFamily="34" charset="0"/>
               <a:buChar char="•"/>
             </a:pPr>
-            <a:endParaRPr lang="fr-FR" dirty="0"/>
-          </a:p>
-          <a:p>
-            <a:pPr>
-              <a:buFont typeface="Arial" pitchFamily="34" charset="0"/>
-              <a:buChar char="•"/>
-            </a:pPr>
-            <a:r>
-              <a:rPr lang="fr-FR" dirty="0" err="1" smtClean="0"/>
-              <a:t>Android</a:t>
-            </a:r>
-            <a:r>
-              <a:rPr lang="fr-FR" dirty="0" smtClean="0"/>
-              <a:t> permet l’installation d’application n'émanant pas du Play Store.</a:t>
-            </a:r>
-            <a:endParaRPr lang="fr-FR" dirty="0"/>
+            <a:r>
+              <a:rPr lang="fr-FR" sz="2400" b="1" dirty="0" smtClean="0"/>
+              <a:t>Possibilité d’envoyer des emails de la part d’un des contacts à l’utilisateur</a:t>
+            </a:r>
+            <a:endParaRPr lang="fr-FR" sz="2400" b="1" dirty="0"/>
           </a:p>
         </p:txBody>
       </p:sp>
@@ -4764,7 +6069,396 @@
   <p:timing>
     <p:tnLst>
       <p:par>
-        <p:cTn id="1" dur="indefinite" restart="never" nodeType="tmRoot"/>
+        <p:cTn id="1" dur="indefinite" restart="never" nodeType="tmRoot">
+          <p:childTnLst>
+            <p:seq concurrent="1" nextAc="seek">
+              <p:cTn id="2" dur="indefinite" nodeType="mainSeq">
+                <p:childTnLst>
+                  <p:par>
+                    <p:cTn id="3" fill="hold">
+                      <p:stCondLst>
+                        <p:cond delay="indefinite"/>
+                      </p:stCondLst>
+                      <p:childTnLst>
+                        <p:par>
+                          <p:cTn id="4" fill="hold">
+                            <p:stCondLst>
+                              <p:cond delay="0"/>
+                            </p:stCondLst>
+                            <p:childTnLst>
+                              <p:par>
+                                <p:cTn id="5" presetID="10" presetClass="entr" presetSubtype="0" fill="hold" nodeType="clickEffect">
+                                  <p:stCondLst>
+                                    <p:cond delay="0"/>
+                                  </p:stCondLst>
+                                  <p:childTnLst>
+                                    <p:set>
+                                      <p:cBhvr>
+                                        <p:cTn id="6" dur="1" fill="hold">
+                                          <p:stCondLst>
+                                            <p:cond delay="0"/>
+                                          </p:stCondLst>
+                                        </p:cTn>
+                                        <p:tgtEl>
+                                          <p:spTgt spid="3">
+                                            <p:txEl>
+                                              <p:pRg st="0" end="0"/>
+                                            </p:txEl>
+                                          </p:spTgt>
+                                        </p:tgtEl>
+                                        <p:attrNameLst>
+                                          <p:attrName>style.visibility</p:attrName>
+                                        </p:attrNameLst>
+                                      </p:cBhvr>
+                                      <p:to>
+                                        <p:strVal val="visible"/>
+                                      </p:to>
+                                    </p:set>
+                                    <p:animEffect transition="in" filter="fade">
+                                      <p:cBhvr>
+                                        <p:cTn id="7" dur="500"/>
+                                        <p:tgtEl>
+                                          <p:spTgt spid="3">
+                                            <p:txEl>
+                                              <p:pRg st="0" end="0"/>
+                                            </p:txEl>
+                                          </p:spTgt>
+                                        </p:tgtEl>
+                                      </p:cBhvr>
+                                    </p:animEffect>
+                                  </p:childTnLst>
+                                </p:cTn>
+                              </p:par>
+                            </p:childTnLst>
+                          </p:cTn>
+                        </p:par>
+                      </p:childTnLst>
+                    </p:cTn>
+                  </p:par>
+                  <p:par>
+                    <p:cTn id="8" fill="hold">
+                      <p:stCondLst>
+                        <p:cond delay="indefinite"/>
+                      </p:stCondLst>
+                      <p:childTnLst>
+                        <p:par>
+                          <p:cTn id="9" fill="hold">
+                            <p:stCondLst>
+                              <p:cond delay="0"/>
+                            </p:stCondLst>
+                            <p:childTnLst>
+                              <p:par>
+                                <p:cTn id="10" presetID="10" presetClass="entr" presetSubtype="0" fill="hold" nodeType="clickEffect">
+                                  <p:stCondLst>
+                                    <p:cond delay="0"/>
+                                  </p:stCondLst>
+                                  <p:childTnLst>
+                                    <p:set>
+                                      <p:cBhvr>
+                                        <p:cTn id="11" dur="1" fill="hold">
+                                          <p:stCondLst>
+                                            <p:cond delay="0"/>
+                                          </p:stCondLst>
+                                        </p:cTn>
+                                        <p:tgtEl>
+                                          <p:spTgt spid="3">
+                                            <p:txEl>
+                                              <p:pRg st="2" end="2"/>
+                                            </p:txEl>
+                                          </p:spTgt>
+                                        </p:tgtEl>
+                                        <p:attrNameLst>
+                                          <p:attrName>style.visibility</p:attrName>
+                                        </p:attrNameLst>
+                                      </p:cBhvr>
+                                      <p:to>
+                                        <p:strVal val="visible"/>
+                                      </p:to>
+                                    </p:set>
+                                    <p:animEffect transition="in" filter="fade">
+                                      <p:cBhvr>
+                                        <p:cTn id="12" dur="500"/>
+                                        <p:tgtEl>
+                                          <p:spTgt spid="3">
+                                            <p:txEl>
+                                              <p:pRg st="2" end="2"/>
+                                            </p:txEl>
+                                          </p:spTgt>
+                                        </p:tgtEl>
+                                      </p:cBhvr>
+                                    </p:animEffect>
+                                  </p:childTnLst>
+                                </p:cTn>
+                              </p:par>
+                            </p:childTnLst>
+                          </p:cTn>
+                        </p:par>
+                      </p:childTnLst>
+                    </p:cTn>
+                  </p:par>
+                  <p:par>
+                    <p:cTn id="13" fill="hold">
+                      <p:stCondLst>
+                        <p:cond delay="indefinite"/>
+                      </p:stCondLst>
+                      <p:childTnLst>
+                        <p:par>
+                          <p:cTn id="14" fill="hold">
+                            <p:stCondLst>
+                              <p:cond delay="0"/>
+                            </p:stCondLst>
+                            <p:childTnLst>
+                              <p:par>
+                                <p:cTn id="15" presetID="10" presetClass="entr" presetSubtype="0" fill="hold" nodeType="clickEffect">
+                                  <p:stCondLst>
+                                    <p:cond delay="0"/>
+                                  </p:stCondLst>
+                                  <p:childTnLst>
+                                    <p:set>
+                                      <p:cBhvr>
+                                        <p:cTn id="16" dur="1" fill="hold">
+                                          <p:stCondLst>
+                                            <p:cond delay="0"/>
+                                          </p:stCondLst>
+                                        </p:cTn>
+                                        <p:tgtEl>
+                                          <p:spTgt spid="3">
+                                            <p:txEl>
+                                              <p:pRg st="4" end="4"/>
+                                            </p:txEl>
+                                          </p:spTgt>
+                                        </p:tgtEl>
+                                        <p:attrNameLst>
+                                          <p:attrName>style.visibility</p:attrName>
+                                        </p:attrNameLst>
+                                      </p:cBhvr>
+                                      <p:to>
+                                        <p:strVal val="visible"/>
+                                      </p:to>
+                                    </p:set>
+                                    <p:animEffect transition="in" filter="fade">
+                                      <p:cBhvr>
+                                        <p:cTn id="17" dur="500"/>
+                                        <p:tgtEl>
+                                          <p:spTgt spid="3">
+                                            <p:txEl>
+                                              <p:pRg st="4" end="4"/>
+                                            </p:txEl>
+                                          </p:spTgt>
+                                        </p:tgtEl>
+                                      </p:cBhvr>
+                                    </p:animEffect>
+                                  </p:childTnLst>
+                                </p:cTn>
+                              </p:par>
+                            </p:childTnLst>
+                          </p:cTn>
+                        </p:par>
+                      </p:childTnLst>
+                    </p:cTn>
+                  </p:par>
+                  <p:par>
+                    <p:cTn id="18" fill="hold">
+                      <p:stCondLst>
+                        <p:cond delay="indefinite"/>
+                      </p:stCondLst>
+                      <p:childTnLst>
+                        <p:par>
+                          <p:cTn id="19" fill="hold">
+                            <p:stCondLst>
+                              <p:cond delay="0"/>
+                            </p:stCondLst>
+                            <p:childTnLst>
+                              <p:par>
+                                <p:cTn id="20" presetID="10" presetClass="entr" presetSubtype="0" fill="hold" nodeType="clickEffect">
+                                  <p:stCondLst>
+                                    <p:cond delay="0"/>
+                                  </p:stCondLst>
+                                  <p:childTnLst>
+                                    <p:set>
+                                      <p:cBhvr>
+                                        <p:cTn id="21" dur="1" fill="hold">
+                                          <p:stCondLst>
+                                            <p:cond delay="0"/>
+                                          </p:stCondLst>
+                                        </p:cTn>
+                                        <p:tgtEl>
+                                          <p:spTgt spid="3">
+                                            <p:txEl>
+                                              <p:pRg st="6" end="6"/>
+                                            </p:txEl>
+                                          </p:spTgt>
+                                        </p:tgtEl>
+                                        <p:attrNameLst>
+                                          <p:attrName>style.visibility</p:attrName>
+                                        </p:attrNameLst>
+                                      </p:cBhvr>
+                                      <p:to>
+                                        <p:strVal val="visible"/>
+                                      </p:to>
+                                    </p:set>
+                                    <p:animEffect transition="in" filter="fade">
+                                      <p:cBhvr>
+                                        <p:cTn id="22" dur="500"/>
+                                        <p:tgtEl>
+                                          <p:spTgt spid="3">
+                                            <p:txEl>
+                                              <p:pRg st="6" end="6"/>
+                                            </p:txEl>
+                                          </p:spTgt>
+                                        </p:tgtEl>
+                                      </p:cBhvr>
+                                    </p:animEffect>
+                                  </p:childTnLst>
+                                </p:cTn>
+                              </p:par>
+                            </p:childTnLst>
+                          </p:cTn>
+                        </p:par>
+                      </p:childTnLst>
+                    </p:cTn>
+                  </p:par>
+                  <p:par>
+                    <p:cTn id="23" fill="hold">
+                      <p:stCondLst>
+                        <p:cond delay="indefinite"/>
+                      </p:stCondLst>
+                      <p:childTnLst>
+                        <p:par>
+                          <p:cTn id="24" fill="hold">
+                            <p:stCondLst>
+                              <p:cond delay="0"/>
+                            </p:stCondLst>
+                            <p:childTnLst>
+                              <p:par>
+                                <p:cTn id="25" presetID="10" presetClass="entr" presetSubtype="0" fill="hold" nodeType="clickEffect">
+                                  <p:stCondLst>
+                                    <p:cond delay="0"/>
+                                  </p:stCondLst>
+                                  <p:childTnLst>
+                                    <p:set>
+                                      <p:cBhvr>
+                                        <p:cTn id="26" dur="1" fill="hold">
+                                          <p:stCondLst>
+                                            <p:cond delay="0"/>
+                                          </p:stCondLst>
+                                        </p:cTn>
+                                        <p:tgtEl>
+                                          <p:spTgt spid="3">
+                                            <p:txEl>
+                                              <p:pRg st="8" end="8"/>
+                                            </p:txEl>
+                                          </p:spTgt>
+                                        </p:tgtEl>
+                                        <p:attrNameLst>
+                                          <p:attrName>style.visibility</p:attrName>
+                                        </p:attrNameLst>
+                                      </p:cBhvr>
+                                      <p:to>
+                                        <p:strVal val="visible"/>
+                                      </p:to>
+                                    </p:set>
+                                    <p:animEffect transition="in" filter="fade">
+                                      <p:cBhvr>
+                                        <p:cTn id="27" dur="500"/>
+                                        <p:tgtEl>
+                                          <p:spTgt spid="3">
+                                            <p:txEl>
+                                              <p:pRg st="8" end="8"/>
+                                            </p:txEl>
+                                          </p:spTgt>
+                                        </p:tgtEl>
+                                      </p:cBhvr>
+                                    </p:animEffect>
+                                  </p:childTnLst>
+                                </p:cTn>
+                              </p:par>
+                            </p:childTnLst>
+                          </p:cTn>
+                        </p:par>
+                      </p:childTnLst>
+                    </p:cTn>
+                  </p:par>
+                  <p:par>
+                    <p:cTn id="28" fill="hold">
+                      <p:stCondLst>
+                        <p:cond delay="indefinite"/>
+                      </p:stCondLst>
+                      <p:childTnLst>
+                        <p:par>
+                          <p:cTn id="29" fill="hold">
+                            <p:stCondLst>
+                              <p:cond delay="0"/>
+                            </p:stCondLst>
+                            <p:childTnLst>
+                              <p:par>
+                                <p:cTn id="30" presetID="10" presetClass="entr" presetSubtype="0" fill="hold" nodeType="clickEffect">
+                                  <p:stCondLst>
+                                    <p:cond delay="0"/>
+                                  </p:stCondLst>
+                                  <p:childTnLst>
+                                    <p:set>
+                                      <p:cBhvr>
+                                        <p:cTn id="31" dur="1" fill="hold">
+                                          <p:stCondLst>
+                                            <p:cond delay="0"/>
+                                          </p:stCondLst>
+                                        </p:cTn>
+                                        <p:tgtEl>
+                                          <p:spTgt spid="3">
+                                            <p:txEl>
+                                              <p:pRg st="10" end="10"/>
+                                            </p:txEl>
+                                          </p:spTgt>
+                                        </p:tgtEl>
+                                        <p:attrNameLst>
+                                          <p:attrName>style.visibility</p:attrName>
+                                        </p:attrNameLst>
+                                      </p:cBhvr>
+                                      <p:to>
+                                        <p:strVal val="visible"/>
+                                      </p:to>
+                                    </p:set>
+                                    <p:animEffect transition="in" filter="fade">
+                                      <p:cBhvr>
+                                        <p:cTn id="32" dur="500"/>
+                                        <p:tgtEl>
+                                          <p:spTgt spid="3">
+                                            <p:txEl>
+                                              <p:pRg st="10" end="10"/>
+                                            </p:txEl>
+                                          </p:spTgt>
+                                        </p:tgtEl>
+                                      </p:cBhvr>
+                                    </p:animEffect>
+                                  </p:childTnLst>
+                                </p:cTn>
+                              </p:par>
+                            </p:childTnLst>
+                          </p:cTn>
+                        </p:par>
+                      </p:childTnLst>
+                    </p:cTn>
+                  </p:par>
+                </p:childTnLst>
+              </p:cTn>
+              <p:prevCondLst>
+                <p:cond evt="onPrev" delay="0">
+                  <p:tgtEl>
+                    <p:sldTgt/>
+                  </p:tgtEl>
+                </p:cond>
+              </p:prevCondLst>
+              <p:nextCondLst>
+                <p:cond evt="onNext" delay="0">
+                  <p:tgtEl>
+                    <p:sldTgt/>
+                  </p:tgtEl>
+                </p:cond>
+              </p:nextCondLst>
+            </p:seq>
+          </p:childTnLst>
+        </p:cTn>
       </p:par>
     </p:tnLst>
   </p:timing>
@@ -4825,6 +6519,255 @@
             <a:pPr algn="l"/>
             <a:r>
               <a:rPr lang="fr-FR" dirty="0" smtClean="0"/>
+              <a:t>Comparaison IOS et Windows Phone</a:t>
+            </a:r>
+            <a:endParaRPr lang="fr-FR" dirty="0"/>
+          </a:p>
+        </p:txBody>
+      </p:sp>
+      <p:sp>
+        <p:nvSpPr>
+          <p:cNvPr id="4" name="ZoneTexte 3"/>
+          <p:cNvSpPr txBox="1"/>
+          <p:nvPr/>
+        </p:nvSpPr>
+        <p:spPr>
+          <a:xfrm>
+            <a:off x="827584" y="1772816"/>
+            <a:ext cx="8316416" cy="2062103"/>
+          </a:xfrm>
+          <a:prstGeom prst="rect">
+            <a:avLst/>
+          </a:prstGeom>
+          <a:noFill/>
+        </p:spPr>
+        <p:txBody>
+          <a:bodyPr wrap="square" rtlCol="0">
+            <a:spAutoFit/>
+          </a:bodyPr>
+          <a:lstStyle/>
+          <a:p>
+            <a:r>
+              <a:rPr lang="fr-FR" sz="2800" b="1" u="sng" dirty="0" smtClean="0"/>
+              <a:t>Points</a:t>
+            </a:r>
+            <a:r>
+              <a:rPr lang="fr-FR" sz="2800" u="sng" dirty="0" smtClean="0"/>
+              <a:t> </a:t>
+            </a:r>
+            <a:r>
+              <a:rPr lang="fr-FR" sz="2800" b="1" u="sng" dirty="0" smtClean="0"/>
+              <a:t>communs</a:t>
+            </a:r>
+            <a:r>
+              <a:rPr lang="fr-FR" sz="2800" u="sng" dirty="0" smtClean="0"/>
+              <a:t> :</a:t>
+            </a:r>
+          </a:p>
+          <a:p>
+            <a:endParaRPr lang="fr-FR" sz="2000" dirty="0"/>
+          </a:p>
+          <a:p>
+            <a:pPr>
+              <a:buFont typeface="Arial" pitchFamily="34" charset="0"/>
+              <a:buChar char="•"/>
+            </a:pPr>
+            <a:r>
+              <a:rPr lang="fr-FR" sz="2000" dirty="0" smtClean="0"/>
+              <a:t>Même genre de permissions accordées aux </a:t>
+            </a:r>
+            <a:r>
+              <a:rPr lang="fr-FR" sz="2000" dirty="0" smtClean="0"/>
+              <a:t>applications</a:t>
+            </a:r>
+            <a:endParaRPr lang="fr-FR" sz="2000" dirty="0"/>
+          </a:p>
+          <a:p>
+            <a:pPr>
+              <a:buFont typeface="Arial" pitchFamily="34" charset="0"/>
+              <a:buChar char="•"/>
+            </a:pPr>
+            <a:r>
+              <a:rPr lang="fr-FR" sz="2000" dirty="0" smtClean="0"/>
+              <a:t>Une fois l’application installée, le vol d’informations est possible sur les 3 </a:t>
+            </a:r>
+            <a:r>
+              <a:rPr lang="fr-FR" sz="2000" dirty="0" smtClean="0"/>
+              <a:t>plateformes</a:t>
+            </a:r>
+          </a:p>
+          <a:p>
+            <a:pPr>
+              <a:buFont typeface="Arial" pitchFamily="34" charset="0"/>
+              <a:buChar char="•"/>
+            </a:pPr>
+            <a:r>
+              <a:rPr lang="fr-FR" sz="2000" dirty="0" smtClean="0"/>
+              <a:t>Abus des permissions requises pour installer les applications</a:t>
+            </a:r>
+            <a:endParaRPr lang="fr-FR" sz="2000" dirty="0"/>
+          </a:p>
+        </p:txBody>
+      </p:sp>
+      <p:sp>
+        <p:nvSpPr>
+          <p:cNvPr id="5" name="ZoneTexte 4"/>
+          <p:cNvSpPr txBox="1"/>
+          <p:nvPr/>
+        </p:nvSpPr>
+        <p:spPr>
+          <a:xfrm>
+            <a:off x="814620" y="3988603"/>
+            <a:ext cx="7848872" cy="2646878"/>
+          </a:xfrm>
+          <a:prstGeom prst="rect">
+            <a:avLst/>
+          </a:prstGeom>
+          <a:noFill/>
+        </p:spPr>
+        <p:txBody>
+          <a:bodyPr wrap="square" rtlCol="0">
+            <a:spAutoFit/>
+          </a:bodyPr>
+          <a:lstStyle/>
+          <a:p>
+            <a:r>
+              <a:rPr lang="fr-FR" sz="2800" b="1" u="sng" dirty="0" smtClean="0"/>
+              <a:t>Différences</a:t>
+            </a:r>
+            <a:r>
+              <a:rPr lang="fr-FR" sz="2800" u="sng" dirty="0" smtClean="0"/>
+              <a:t> :</a:t>
+            </a:r>
+          </a:p>
+          <a:p>
+            <a:endParaRPr lang="fr-FR" dirty="0"/>
+          </a:p>
+          <a:p>
+            <a:pPr>
+              <a:buFont typeface="Arial" pitchFamily="34" charset="0"/>
+              <a:buChar char="•"/>
+            </a:pPr>
+            <a:r>
+              <a:rPr lang="fr-FR" sz="2000" dirty="0" smtClean="0"/>
+              <a:t>Android permet à l’utilisateur de savoir les permissions accordées par l’application au </a:t>
+            </a:r>
+            <a:r>
+              <a:rPr lang="fr-FR" sz="2000" dirty="0" smtClean="0"/>
+              <a:t>téléchargement</a:t>
+            </a:r>
+            <a:endParaRPr lang="fr-FR" sz="2000" dirty="0"/>
+          </a:p>
+          <a:p>
+            <a:pPr>
+              <a:buFont typeface="Arial" pitchFamily="34" charset="0"/>
+              <a:buChar char="•"/>
+            </a:pPr>
+            <a:r>
+              <a:rPr lang="fr-FR" sz="2000" dirty="0" smtClean="0"/>
+              <a:t>Les applications IOS et Windows </a:t>
+            </a:r>
+            <a:r>
+              <a:rPr lang="fr-FR" sz="2000" dirty="0" smtClean="0"/>
+              <a:t>Phone </a:t>
+            </a:r>
+            <a:r>
+              <a:rPr lang="fr-FR" sz="2000" dirty="0" smtClean="0"/>
+              <a:t>sont réellement testées et approuvées par des « testeurs » d’Apple ou Microsoft, avant sa mise sur le </a:t>
+            </a:r>
+            <a:r>
+              <a:rPr lang="fr-FR" sz="2000" dirty="0" smtClean="0"/>
+              <a:t>Store</a:t>
+            </a:r>
+            <a:endParaRPr lang="fr-FR" sz="2000" dirty="0"/>
+          </a:p>
+          <a:p>
+            <a:pPr>
+              <a:buFont typeface="Arial" pitchFamily="34" charset="0"/>
+              <a:buChar char="•"/>
+            </a:pPr>
+            <a:r>
+              <a:rPr lang="fr-FR" sz="2000" dirty="0" smtClean="0"/>
+              <a:t>Android permet l’installation d’application n'émanant pas du Play </a:t>
+            </a:r>
+            <a:r>
+              <a:rPr lang="fr-FR" sz="2000" dirty="0" smtClean="0"/>
+              <a:t>Store</a:t>
+            </a:r>
+            <a:endParaRPr lang="fr-FR" sz="2000" dirty="0"/>
+          </a:p>
+        </p:txBody>
+      </p:sp>
+    </p:spTree>
+  </p:cSld>
+  <p:clrMapOvr>
+    <a:masterClrMapping/>
+  </p:clrMapOvr>
+  <p:transition/>
+  <p:timing>
+    <p:tnLst>
+      <p:par>
+        <p:cTn id="1" dur="indefinite" restart="never" nodeType="tmRoot"/>
+      </p:par>
+    </p:tnLst>
+  </p:timing>
+</p:sld>
+</file>
+
+<file path=ppt/slides/slide17.xml><?xml version="1.0" encoding="utf-8"?>
+<p:sld xmlns:a="http://schemas.openxmlformats.org/drawingml/2006/main" xmlns:r="http://schemas.openxmlformats.org/officeDocument/2006/relationships" xmlns:p="http://schemas.openxmlformats.org/presentationml/2006/main">
+  <p:cSld>
+    <p:spTree>
+      <p:nvGrpSpPr>
+        <p:cNvPr id="1" name=""/>
+        <p:cNvGrpSpPr/>
+        <p:nvPr/>
+      </p:nvGrpSpPr>
+      <p:grpSpPr>
+        <a:xfrm>
+          <a:off x="0" y="0"/>
+          <a:ext cx="0" cy="0"/>
+          <a:chOff x="0" y="0"/>
+          <a:chExt cx="0" cy="0"/>
+        </a:xfrm>
+      </p:grpSpPr>
+      <p:sp>
+        <p:nvSpPr>
+          <p:cNvPr id="2" name="Titre 1"/>
+          <p:cNvSpPr>
+            <a:spLocks noGrp="1"/>
+          </p:cNvSpPr>
+          <p:nvPr>
+            <p:ph type="title"/>
+          </p:nvPr>
+        </p:nvSpPr>
+        <p:spPr>
+          <a:xfrm>
+            <a:off x="539552" y="260648"/>
+            <a:ext cx="8867328" cy="1143000"/>
+          </a:xfrm>
+        </p:spPr>
+        <p:style>
+          <a:lnRef idx="0">
+            <a:schemeClr val="accent1"/>
+          </a:lnRef>
+          <a:fillRef idx="3">
+            <a:schemeClr val="accent1"/>
+          </a:fillRef>
+          <a:effectRef idx="3">
+            <a:schemeClr val="accent1"/>
+          </a:effectRef>
+          <a:fontRef idx="minor">
+            <a:schemeClr val="lt1"/>
+          </a:fontRef>
+        </p:style>
+        <p:txBody>
+          <a:bodyPr/>
+          <a:lstStyle/>
+          <a:p>
+            <a:pPr algn="l"/>
+            <a:r>
+              <a:rPr lang="fr-FR" dirty="0" smtClean="0"/>
               <a:t>Conclusion</a:t>
             </a:r>
             <a:endParaRPr lang="fr-FR" dirty="0"/>
@@ -4840,7 +6783,7 @@
         <p:spPr>
           <a:xfrm>
             <a:off x="539552" y="1628800"/>
-            <a:ext cx="7992888" cy="2308324"/>
+            <a:ext cx="7992888" cy="2769989"/>
           </a:xfrm>
           <a:prstGeom prst="rect">
             <a:avLst/>
@@ -4858,21 +6801,21 @@
               <a:buChar char="•"/>
             </a:pPr>
             <a:r>
-              <a:rPr lang="fr-FR" dirty="0" smtClean="0"/>
+              <a:rPr lang="fr-FR" sz="2000" b="1" dirty="0" smtClean="0"/>
               <a:t>Bien lire les permissions sur </a:t>
             </a:r>
             <a:r>
-              <a:rPr lang="fr-FR" dirty="0" err="1" smtClean="0"/>
+              <a:rPr lang="fr-FR" sz="2000" b="1" dirty="0" err="1" smtClean="0"/>
               <a:t>android</a:t>
             </a:r>
-            <a:endParaRPr lang="fr-FR" dirty="0" smtClean="0"/>
+            <a:endParaRPr lang="fr-FR" sz="2000" b="1" dirty="0" smtClean="0"/>
           </a:p>
           <a:p>
             <a:pPr>
               <a:buFont typeface="Arial" pitchFamily="34" charset="0"/>
               <a:buChar char="•"/>
             </a:pPr>
-            <a:endParaRPr lang="fr-FR" dirty="0"/>
+            <a:endParaRPr lang="fr-FR" sz="2000" b="1" dirty="0"/>
           </a:p>
           <a:p>
             <a:pPr>
@@ -4880,11 +6823,11 @@
               <a:buChar char="•"/>
             </a:pPr>
             <a:r>
-              <a:rPr lang="fr-FR" dirty="0" err="1" smtClean="0"/>
+              <a:rPr lang="fr-FR" sz="2000" b="1" dirty="0" err="1" smtClean="0"/>
               <a:t>Android</a:t>
             </a:r>
             <a:r>
-              <a:rPr lang="fr-FR" dirty="0" smtClean="0"/>
+              <a:rPr lang="fr-FR" sz="2000" b="1" dirty="0" smtClean="0"/>
               <a:t> est un système qui laisse de la liberté aux développeurs et aux utilisateurs</a:t>
             </a:r>
           </a:p>
@@ -4893,7 +6836,7 @@
               <a:buFont typeface="Arial" pitchFamily="34" charset="0"/>
               <a:buChar char="•"/>
             </a:pPr>
-            <a:endParaRPr lang="fr-FR" dirty="0" smtClean="0"/>
+            <a:endParaRPr lang="fr-FR" sz="2000" b="1" dirty="0" smtClean="0"/>
           </a:p>
           <a:p>
             <a:pPr>
@@ -4901,14 +6844,14 @@
               <a:buChar char="•"/>
             </a:pPr>
             <a:r>
-              <a:rPr lang="fr-FR" dirty="0" err="1" smtClean="0"/>
+              <a:rPr lang="fr-FR" sz="2000" b="1" dirty="0" err="1" smtClean="0"/>
               <a:t>Android</a:t>
             </a:r>
             <a:r>
-              <a:rPr lang="fr-FR" dirty="0" smtClean="0"/>
+              <a:rPr lang="fr-FR" sz="2000" b="1" dirty="0" smtClean="0"/>
               <a:t> est basé sur la confiance</a:t>
             </a:r>
-            <a:endParaRPr lang="fr-FR" dirty="0"/>
+            <a:endParaRPr lang="fr-FR" sz="2000" b="1" dirty="0"/>
           </a:p>
           <a:p>
             <a:endParaRPr lang="fr-FR" dirty="0" smtClean="0"/>
@@ -4929,7 +6872,7 @@
         </p:nvSpPr>
         <p:spPr>
           <a:xfrm>
-            <a:off x="251520" y="3789040"/>
+            <a:off x="1295636" y="4029457"/>
             <a:ext cx="6480720" cy="369332"/>
           </a:xfrm>
           <a:prstGeom prst="rect">
@@ -4943,11 +6886,12 @@
           </a:bodyPr>
           <a:lstStyle/>
           <a:p>
-            <a:r>
-              <a:rPr lang="fr-FR" u="sng" dirty="0" smtClean="0"/>
+            <a:pPr algn="ctr"/>
+            <a:r>
+              <a:rPr lang="fr-FR" b="1" i="1" dirty="0" smtClean="0"/>
               <a:t>Applications pouvant servir :</a:t>
             </a:r>
-            <a:endParaRPr lang="fr-FR" u="sng" dirty="0"/>
+            <a:endParaRPr lang="fr-FR" b="1" i="1" dirty="0"/>
           </a:p>
         </p:txBody>
       </p:sp>
@@ -5290,7 +7234,7 @@
 </p:sld>
 </file>
 
-<file path=ppt/slides/slide17.xml><?xml version="1.0" encoding="utf-8"?>
+<file path=ppt/slides/slide18.xml><?xml version="1.0" encoding="utf-8"?>
 <p:sld xmlns:a="http://schemas.openxmlformats.org/drawingml/2006/main" xmlns:r="http://schemas.openxmlformats.org/officeDocument/2006/relationships" xmlns:p="http://schemas.openxmlformats.org/presentationml/2006/main">
   <p:cSld>
     <p:spTree>
@@ -5307,44 +7251,6 @@
           <a:chExt cx="0" cy="0"/>
         </a:xfrm>
       </p:grpSpPr>
-      <p:sp>
-        <p:nvSpPr>
-          <p:cNvPr id="2" name="Titre 1"/>
-          <p:cNvSpPr>
-            <a:spLocks noGrp="1"/>
-          </p:cNvSpPr>
-          <p:nvPr>
-            <p:ph type="title"/>
-          </p:nvPr>
-        </p:nvSpPr>
-        <p:spPr/>
-        <p:txBody>
-          <a:bodyPr/>
-          <a:lstStyle/>
-          <a:p>
-            <a:endParaRPr lang="fr-FR"/>
-          </a:p>
-        </p:txBody>
-      </p:sp>
-      <p:sp>
-        <p:nvSpPr>
-          <p:cNvPr id="3" name="Espace réservé du contenu 2"/>
-          <p:cNvSpPr>
-            <a:spLocks noGrp="1"/>
-          </p:cNvSpPr>
-          <p:nvPr>
-            <p:ph idx="1"/>
-          </p:nvPr>
-        </p:nvSpPr>
-        <p:spPr/>
-        <p:txBody>
-          <a:bodyPr/>
-          <a:lstStyle/>
-          <a:p>
-            <a:endParaRPr lang="fr-FR" dirty="0"/>
-          </a:p>
-        </p:txBody>
-      </p:sp>
       <p:sp>
         <p:nvSpPr>
           <p:cNvPr id="4" name="Titre 1"/>
@@ -5414,8 +7320,39 @@
                 <a:ea typeface="+mn-ea"/>
                 <a:cs typeface="+mn-cs"/>
               </a:rPr>
-              <a:t>Questions ??</a:t>
-            </a:r>
+              <a:t>Questions </a:t>
+            </a:r>
+            <a:r>
+              <a:rPr kumimoji="0" lang="fr-FR" sz="4400" b="0" i="0" u="none" strike="noStrike" kern="1200" cap="none" spc="0" normalizeH="0" baseline="0" noProof="0" dirty="0" smtClean="0">
+                <a:ln>
+                  <a:noFill/>
+                </a:ln>
+                <a:solidFill>
+                  <a:schemeClr val="lt1"/>
+                </a:solidFill>
+                <a:effectLst/>
+                <a:uLnTx/>
+                <a:uFillTx/>
+                <a:latin typeface="+mn-lt"/>
+                <a:ea typeface="+mn-ea"/>
+                <a:cs typeface="+mn-cs"/>
+              </a:rPr>
+              <a:t>?</a:t>
+            </a:r>
+            <a:endParaRPr kumimoji="0" lang="fr-FR" sz="4400" b="0" i="0" u="none" strike="noStrike" kern="1200" cap="none" spc="0" normalizeH="0" baseline="0" noProof="0" dirty="0" smtClean="0">
+              <a:ln>
+                <a:noFill/>
+              </a:ln>
+              <a:solidFill>
+                <a:schemeClr val="lt1"/>
+              </a:solidFill>
+              <a:effectLst/>
+              <a:uLnTx/>
+              <a:uFillTx/>
+              <a:latin typeface="+mn-lt"/>
+              <a:ea typeface="+mn-ea"/>
+              <a:cs typeface="+mn-cs"/>
+            </a:endParaRPr>
           </a:p>
         </p:txBody>
       </p:sp>
@@ -5536,14 +7473,14 @@
                 <a:latin typeface="Adobe Devanagari" pitchFamily="18" charset="0"/>
                 <a:cs typeface="Adobe Devanagari" pitchFamily="18" charset="0"/>
               </a:rPr>
-              <a:t>  Etat des lieux d’</a:t>
-            </a:r>
-            <a:r>
-              <a:rPr lang="fr-FR" dirty="0" err="1" smtClean="0">
+              <a:t>  Etat des lieux </a:t>
+            </a:r>
+            <a:r>
+              <a:rPr lang="fr-FR" dirty="0" smtClean="0">
                 <a:latin typeface="Adobe Devanagari" pitchFamily="18" charset="0"/>
                 <a:cs typeface="Adobe Devanagari" pitchFamily="18" charset="0"/>
               </a:rPr>
-              <a:t>android</a:t>
+              <a:t>d’Android</a:t>
             </a:r>
             <a:endParaRPr lang="fr-FR" dirty="0" smtClean="0">
               <a:latin typeface="Adobe Devanagari" pitchFamily="18" charset="0"/>
@@ -5585,14 +7522,14 @@
                 <a:latin typeface="Adobe Devanagari" pitchFamily="18" charset="0"/>
                 <a:cs typeface="Adobe Devanagari" pitchFamily="18" charset="0"/>
               </a:rPr>
-              <a:t> Les possibilités malicieuses d’</a:t>
-            </a:r>
-            <a:r>
-              <a:rPr lang="fr-FR" dirty="0" err="1" smtClean="0">
+              <a:t> Les possibilités malicieuses </a:t>
+            </a:r>
+            <a:r>
+              <a:rPr lang="fr-FR" dirty="0" smtClean="0">
                 <a:latin typeface="Adobe Devanagari" pitchFamily="18" charset="0"/>
                 <a:cs typeface="Adobe Devanagari" pitchFamily="18" charset="0"/>
               </a:rPr>
-              <a:t>android</a:t>
+              <a:t>d’Android</a:t>
             </a:r>
             <a:endParaRPr lang="fr-FR" dirty="0" smtClean="0">
               <a:latin typeface="Adobe Devanagari" pitchFamily="18" charset="0"/>
@@ -5738,15 +7675,24 @@
                                   </p:childTnLst>
                                 </p:cTn>
                               </p:par>
+                            </p:childTnLst>
+                          </p:cTn>
+                        </p:par>
+                        <p:par>
+                          <p:cTn id="9" fill="hold">
+                            <p:stCondLst>
+                              <p:cond delay="500"/>
+                            </p:stCondLst>
+                            <p:childTnLst>
                               <p:par>
-                                <p:cTn id="9" presetID="2" presetClass="entr" presetSubtype="2" fill="hold" grpId="0" nodeType="withEffect">
+                                <p:cTn id="10" presetID="2" presetClass="entr" presetSubtype="2" fill="hold" grpId="0" nodeType="afterEffect">
                                   <p:stCondLst>
                                     <p:cond delay="0"/>
                                   </p:stCondLst>
                                   <p:childTnLst>
                                     <p:set>
                                       <p:cBhvr>
-                                        <p:cTn id="10" dur="1" fill="hold">
+                                        <p:cTn id="11" dur="1" fill="hold">
                                           <p:stCondLst>
                                             <p:cond delay="0"/>
                                           </p:stCondLst>
@@ -5768,7 +7714,7 @@
                                     </p:set>
                                     <p:anim calcmode="lin" valueType="num">
                                       <p:cBhvr additive="base">
-                                        <p:cTn id="11" dur="500" fill="hold"/>
+                                        <p:cTn id="12" dur="500" fill="hold"/>
                                         <p:tgtEl>
                                           <p:spTgt spid="3">
                                             <p:txEl>
@@ -5795,7 +7741,7 @@
                                     </p:anim>
                                     <p:anim calcmode="lin" valueType="num">
                                       <p:cBhvr additive="base">
-                                        <p:cTn id="12" dur="500" fill="hold"/>
+                                        <p:cTn id="13" dur="500" fill="hold"/>
                                         <p:tgtEl>
                                           <p:spTgt spid="3">
                                             <p:txEl>
@@ -5823,15 +7769,24 @@
                                   </p:childTnLst>
                                 </p:cTn>
                               </p:par>
+                            </p:childTnLst>
+                          </p:cTn>
+                        </p:par>
+                        <p:par>
+                          <p:cTn id="14" fill="hold">
+                            <p:stCondLst>
+                              <p:cond delay="1000"/>
+                            </p:stCondLst>
+                            <p:childTnLst>
                               <p:par>
-                                <p:cTn id="13" presetID="2" presetClass="entr" presetSubtype="2" fill="hold" grpId="0" nodeType="withEffect">
+                                <p:cTn id="15" presetID="2" presetClass="entr" presetSubtype="2" fill="hold" grpId="0" nodeType="afterEffect">
                                   <p:stCondLst>
                                     <p:cond delay="0"/>
                                   </p:stCondLst>
                                   <p:childTnLst>
                                     <p:set>
                                       <p:cBhvr>
-                                        <p:cTn id="14" dur="1" fill="hold">
+                                        <p:cTn id="16" dur="1" fill="hold">
                                           <p:stCondLst>
                                             <p:cond delay="0"/>
                                           </p:stCondLst>
@@ -5853,7 +7808,7 @@
                                     </p:set>
                                     <p:anim calcmode="lin" valueType="num">
                                       <p:cBhvr additive="base">
-                                        <p:cTn id="15" dur="500" fill="hold"/>
+                                        <p:cTn id="17" dur="500" fill="hold"/>
                                         <p:tgtEl>
                                           <p:spTgt spid="3">
                                             <p:txEl>
@@ -5880,7 +7835,7 @@
                                     </p:anim>
                                     <p:anim calcmode="lin" valueType="num">
                                       <p:cBhvr additive="base">
-                                        <p:cTn id="16" dur="500" fill="hold"/>
+                                        <p:cTn id="18" dur="500" fill="hold"/>
                                         <p:tgtEl>
                                           <p:spTgt spid="3">
                                             <p:txEl>
@@ -5908,15 +7863,24 @@
                                   </p:childTnLst>
                                 </p:cTn>
                               </p:par>
+                            </p:childTnLst>
+                          </p:cTn>
+                        </p:par>
+                        <p:par>
+                          <p:cTn id="19" fill="hold">
+                            <p:stCondLst>
+                              <p:cond delay="1500"/>
+                            </p:stCondLst>
+                            <p:childTnLst>
                               <p:par>
-                                <p:cTn id="17" presetID="2" presetClass="entr" presetSubtype="2" fill="hold" grpId="0" nodeType="withEffect">
+                                <p:cTn id="20" presetID="2" presetClass="entr" presetSubtype="2" fill="hold" grpId="0" nodeType="afterEffect">
                                   <p:stCondLst>
                                     <p:cond delay="0"/>
                                   </p:stCondLst>
                                   <p:childTnLst>
                                     <p:set>
                                       <p:cBhvr>
-                                        <p:cTn id="18" dur="1" fill="hold">
+                                        <p:cTn id="21" dur="1" fill="hold">
                                           <p:stCondLst>
                                             <p:cond delay="0"/>
                                           </p:stCondLst>
@@ -5938,7 +7902,7 @@
                                     </p:set>
                                     <p:anim calcmode="lin" valueType="num">
                                       <p:cBhvr additive="base">
-                                        <p:cTn id="19" dur="500" fill="hold"/>
+                                        <p:cTn id="22" dur="500" fill="hold"/>
                                         <p:tgtEl>
                                           <p:spTgt spid="3">
                                             <p:txEl>
@@ -5965,7 +7929,7 @@
                                     </p:anim>
                                     <p:anim calcmode="lin" valueType="num">
                                       <p:cBhvr additive="base">
-                                        <p:cTn id="20" dur="500" fill="hold"/>
+                                        <p:cTn id="23" dur="500" fill="hold"/>
                                         <p:tgtEl>
                                           <p:spTgt spid="3">
                                             <p:txEl>
@@ -5993,93 +7957,17 @@
                                   </p:childTnLst>
                                 </p:cTn>
                               </p:par>
+                            </p:childTnLst>
+                          </p:cTn>
+                        </p:par>
+                        <p:par>
+                          <p:cTn id="24" fill="hold">
+                            <p:stCondLst>
+                              <p:cond delay="2000"/>
+                            </p:stCondLst>
+                            <p:childTnLst>
                               <p:par>
-                                <p:cTn id="21" presetID="2" presetClass="entr" presetSubtype="2" fill="hold" grpId="0" nodeType="withEffect">
-                                  <p:stCondLst>
-                                    <p:cond delay="0"/>
-                                  </p:stCondLst>
-                                  <p:childTnLst>
-                                    <p:set>
-                                      <p:cBhvr>
-                                        <p:cTn id="22" dur="1" fill="hold">
-                                          <p:stCondLst>
-                                            <p:cond delay="0"/>
-                                          </p:stCondLst>
-                                        </p:cTn>
-                                        <p:tgtEl>
-                                          <p:spTgt spid="3">
-                                            <p:txEl>
-                                              <p:pRg st="3" end="3"/>
-                                            </p:txEl>
-                                          </p:spTgt>
-                                        </p:tgtEl>
-                                        <p:attrNameLst>
-                                          <p:attrName>style.visibility</p:attrName>
-                                        </p:attrNameLst>
-                                      </p:cBhvr>
-                                      <p:to>
-                                        <p:strVal val="visible"/>
-                                      </p:to>
-                                    </p:set>
-                                    <p:anim calcmode="lin" valueType="num">
-                                      <p:cBhvr additive="base">
-                                        <p:cTn id="23" dur="500" fill="hold"/>
-                                        <p:tgtEl>
-                                          <p:spTgt spid="3">
-                                            <p:txEl>
-                                              <p:pRg st="3" end="3"/>
-                                            </p:txEl>
-                                          </p:spTgt>
-                                        </p:tgtEl>
-                                        <p:attrNameLst>
-                                          <p:attrName>ppt_x</p:attrName>
-                                        </p:attrNameLst>
-                                      </p:cBhvr>
-                                      <p:tavLst>
-                                        <p:tav tm="0">
-                                          <p:val>
-                                            <p:strVal val="1+#ppt_w/2"/>
-                                          </p:val>
-                                        </p:tav>
-                                        <p:tav tm="100000">
-                                          <p:val>
-                                            <p:strVal val="#ppt_x"/>
-                                          </p:val>
-                                        </p:tav>
-                                      </p:tavLst>
-                                    </p:anim>
-                                    <p:anim calcmode="lin" valueType="num">
-                                      <p:cBhvr additive="base">
-                                        <p:cTn id="24" dur="500" fill="hold"/>
-                                        <p:tgtEl>
-                                          <p:spTgt spid="3">
-                                            <p:txEl>
-                                              <p:pRg st="3" end="3"/>
-                                            </p:txEl>
-                                          </p:spTgt>
-                                        </p:tgtEl>
-                                        <p:attrNameLst>
-                                          <p:attrName>ppt_y</p:attrName>
-                                        </p:attrNameLst>
-                                      </p:cBhvr>
-                                      <p:tavLst>
-                                        <p:tav tm="0">
-                                          <p:val>
-                                            <p:strVal val="#ppt_y"/>
-                                          </p:val>
-                                        </p:tav>
-                                        <p:tav tm="100000">
-                                          <p:val>
-                                            <p:strVal val="#ppt_y"/>
-                                          </p:val>
-                                        </p:tav>
-                                      </p:tavLst>
-                                    </p:anim>
-                                  </p:childTnLst>
-                                </p:cTn>
-                              </p:par>
-                              <p:par>
-                                <p:cTn id="25" presetID="2" presetClass="entr" presetSubtype="2" fill="hold" grpId="0" nodeType="withEffect">
+                                <p:cTn id="25" presetID="2" presetClass="entr" presetSubtype="2" fill="hold" grpId="0" nodeType="afterEffect">
                                   <p:stCondLst>
                                     <p:cond delay="0"/>
                                   </p:stCondLst>
@@ -6094,7 +7982,7 @@
                                         <p:tgtEl>
                                           <p:spTgt spid="3">
                                             <p:txEl>
-                                              <p:pRg st="4" end="4"/>
+                                              <p:pRg st="3" end="3"/>
                                             </p:txEl>
                                           </p:spTgt>
                                         </p:tgtEl>
@@ -6112,7 +8000,7 @@
                                         <p:tgtEl>
                                           <p:spTgt spid="3">
                                             <p:txEl>
-                                              <p:pRg st="4" end="4"/>
+                                              <p:pRg st="3" end="3"/>
                                             </p:txEl>
                                           </p:spTgt>
                                         </p:tgtEl>
@@ -6139,7 +8027,7 @@
                                         <p:tgtEl>
                                           <p:spTgt spid="3">
                                             <p:txEl>
-                                              <p:pRg st="4" end="4"/>
+                                              <p:pRg st="3" end="3"/>
                                             </p:txEl>
                                           </p:spTgt>
                                         </p:tgtEl>
@@ -6163,15 +8051,24 @@
                                   </p:childTnLst>
                                 </p:cTn>
                               </p:par>
+                            </p:childTnLst>
+                          </p:cTn>
+                        </p:par>
+                        <p:par>
+                          <p:cTn id="29" fill="hold">
+                            <p:stCondLst>
+                              <p:cond delay="2500"/>
+                            </p:stCondLst>
+                            <p:childTnLst>
                               <p:par>
-                                <p:cTn id="29" presetID="2" presetClass="entr" presetSubtype="2" fill="hold" grpId="0" nodeType="withEffect">
+                                <p:cTn id="30" presetID="2" presetClass="entr" presetSubtype="2" fill="hold" grpId="0" nodeType="afterEffect">
                                   <p:stCondLst>
                                     <p:cond delay="0"/>
                                   </p:stCondLst>
                                   <p:childTnLst>
                                     <p:set>
                                       <p:cBhvr>
-                                        <p:cTn id="30" dur="1" fill="hold">
+                                        <p:cTn id="31" dur="1" fill="hold">
                                           <p:stCondLst>
                                             <p:cond delay="0"/>
                                           </p:stCondLst>
@@ -6179,7 +8076,7 @@
                                         <p:tgtEl>
                                           <p:spTgt spid="3">
                                             <p:txEl>
-                                              <p:pRg st="5" end="5"/>
+                                              <p:pRg st="4" end="4"/>
                                             </p:txEl>
                                           </p:spTgt>
                                         </p:tgtEl>
@@ -6193,7 +8090,83 @@
                                     </p:set>
                                     <p:anim calcmode="lin" valueType="num">
                                       <p:cBhvr additive="base">
-                                        <p:cTn id="31" dur="500" fill="hold"/>
+                                        <p:cTn id="32" dur="500" fill="hold"/>
+                                        <p:tgtEl>
+                                          <p:spTgt spid="3">
+                                            <p:txEl>
+                                              <p:pRg st="4" end="4"/>
+                                            </p:txEl>
+                                          </p:spTgt>
+                                        </p:tgtEl>
+                                        <p:attrNameLst>
+                                          <p:attrName>ppt_x</p:attrName>
+                                        </p:attrNameLst>
+                                      </p:cBhvr>
+                                      <p:tavLst>
+                                        <p:tav tm="0">
+                                          <p:val>
+                                            <p:strVal val="1+#ppt_w/2"/>
+                                          </p:val>
+                                        </p:tav>
+                                        <p:tav tm="100000">
+                                          <p:val>
+                                            <p:strVal val="#ppt_x"/>
+                                          </p:val>
+                                        </p:tav>
+                                      </p:tavLst>
+                                    </p:anim>
+                                    <p:anim calcmode="lin" valueType="num">
+                                      <p:cBhvr additive="base">
+                                        <p:cTn id="33" dur="500" fill="hold"/>
+                                        <p:tgtEl>
+                                          <p:spTgt spid="3">
+                                            <p:txEl>
+                                              <p:pRg st="4" end="4"/>
+                                            </p:txEl>
+                                          </p:spTgt>
+                                        </p:tgtEl>
+                                        <p:attrNameLst>
+                                          <p:attrName>ppt_y</p:attrName>
+                                        </p:attrNameLst>
+                                      </p:cBhvr>
+                                      <p:tavLst>
+                                        <p:tav tm="0">
+                                          <p:val>
+                                            <p:strVal val="#ppt_y"/>
+                                          </p:val>
+                                        </p:tav>
+                                        <p:tav tm="100000">
+                                          <p:val>
+                                            <p:strVal val="#ppt_y"/>
+                                          </p:val>
+                                        </p:tav>
+                                      </p:tavLst>
+                                    </p:anim>
+                                  </p:childTnLst>
+                                </p:cTn>
+                              </p:par>
+                            </p:childTnLst>
+                          </p:cTn>
+                        </p:par>
+                        <p:par>
+                          <p:cTn id="34" fill="hold">
+                            <p:stCondLst>
+                              <p:cond delay="3000"/>
+                            </p:stCondLst>
+                            <p:childTnLst>
+                              <p:par>
+                                <p:cTn id="35" presetID="2" presetClass="entr" presetSubtype="2" fill="hold" grpId="0" nodeType="afterEffect">
+                                  <p:stCondLst>
+                                    <p:cond delay="0"/>
+                                  </p:stCondLst>
+                                  <p:childTnLst>
+                                    <p:set>
+                                      <p:cBhvr>
+                                        <p:cTn id="36" dur="1" fill="hold">
+                                          <p:stCondLst>
+                                            <p:cond delay="0"/>
+                                          </p:stCondLst>
+                                        </p:cTn>
                                         <p:tgtEl>
                                           <p:spTgt spid="3">
                                             <p:txEl>
@@ -6202,6 +8175,24 @@
                                           </p:spTgt>
                                         </p:tgtEl>
                                         <p:attrNameLst>
+                                          <p:attrName>style.visibility</p:attrName>
+                                        </p:attrNameLst>
+                                      </p:cBhvr>
+                                      <p:to>
+                                        <p:strVal val="visible"/>
+                                      </p:to>
+                                    </p:set>
+                                    <p:anim calcmode="lin" valueType="num">
+                                      <p:cBhvr additive="base">
+                                        <p:cTn id="37" dur="500" fill="hold"/>
+                                        <p:tgtEl>
+                                          <p:spTgt spid="3">
+                                            <p:txEl>
+                                              <p:pRg st="5" end="5"/>
+                                            </p:txEl>
+                                          </p:spTgt>
+                                        </p:tgtEl>
+                                        <p:attrNameLst>
                                           <p:attrName>ppt_x</p:attrName>
                                         </p:attrNameLst>
                                       </p:cBhvr>
@@ -6220,7 +8211,7 @@
                                     </p:anim>
                                     <p:anim calcmode="lin" valueType="num">
                                       <p:cBhvr additive="base">
-                                        <p:cTn id="32" dur="500" fill="hold"/>
+                                        <p:cTn id="38" dur="500" fill="hold"/>
                                         <p:tgtEl>
                                           <p:spTgt spid="3">
                                             <p:txEl>
@@ -6351,8 +8342,8 @@
         </p:nvSpPr>
         <p:spPr>
           <a:xfrm>
-            <a:off x="683568" y="2996952"/>
-            <a:ext cx="7560840" cy="1754326"/>
+            <a:off x="683568" y="2276872"/>
+            <a:ext cx="7845780" cy="3539430"/>
           </a:xfrm>
           <a:prstGeom prst="rect">
             <a:avLst/>
@@ -6365,26 +8356,64 @@
           </a:bodyPr>
           <a:lstStyle/>
           <a:p>
-            <a:r>
-              <a:rPr lang="en-US" i="1" dirty="0" smtClean="0"/>
+            <a:pPr algn="just"/>
+            <a:r>
+              <a:rPr lang="en-US" sz="2800" i="1" dirty="0" smtClean="0">
+                <a:solidFill>
+                  <a:schemeClr val="accent6">
+                    <a:lumMod val="50000"/>
+                  </a:schemeClr>
+                </a:solidFill>
+              </a:rPr>
               <a:t>“ </a:t>
             </a:r>
             <a:r>
-              <a:rPr lang="en-US" i="1" dirty="0" smtClean="0"/>
-              <a:t>over </a:t>
-            </a:r>
-            <a:r>
-              <a:rPr lang="en-US" i="1" dirty="0"/>
+              <a:rPr lang="en-US" sz="2800" i="1" dirty="0" smtClean="0">
+                <a:solidFill>
+                  <a:schemeClr val="accent6">
+                    <a:lumMod val="50000"/>
+                  </a:schemeClr>
+                </a:solidFill>
+              </a:rPr>
+              <a:t>Over </a:t>
+            </a:r>
+            <a:r>
+              <a:rPr lang="en-US" sz="2800" i="1" dirty="0">
+                <a:solidFill>
+                  <a:schemeClr val="accent6">
+                    <a:lumMod val="50000"/>
+                  </a:schemeClr>
+                </a:solidFill>
+              </a:rPr>
               <a:t>the last year or so, we've been hearing several reports from security firms, saying that SMS is among the top ways for hackers to break into mobile devices and steal information. The hackers achieve that by fooling mobile users into clicking on malicious links in a fashion similar to phishing in email. Be wary of communications hacks</a:t>
             </a:r>
             <a:r>
-              <a:rPr lang="en-US" i="1" dirty="0" smtClean="0"/>
+              <a:rPr lang="en-US" sz="2800" i="1" dirty="0" smtClean="0">
+                <a:solidFill>
+                  <a:schemeClr val="accent6">
+                    <a:lumMod val="50000"/>
+                  </a:schemeClr>
+                </a:solidFill>
+              </a:rPr>
               <a:t>. “</a:t>
             </a:r>
-            <a:endParaRPr lang="en-US" dirty="0" smtClean="0"/>
-          </a:p>
-          <a:p>
-            <a:endParaRPr lang="fr-FR" dirty="0"/>
+            <a:endParaRPr lang="en-US" sz="2800" dirty="0" smtClean="0">
+              <a:solidFill>
+                <a:schemeClr val="accent6">
+                  <a:lumMod val="50000"/>
+                </a:schemeClr>
+              </a:solidFill>
+            </a:endParaRPr>
+          </a:p>
+          <a:p>
+            <a:pPr algn="just"/>
+            <a:endParaRPr lang="fr-FR" sz="2800" dirty="0">
+              <a:solidFill>
+                <a:schemeClr val="accent6">
+                  <a:lumMod val="50000"/>
+                </a:schemeClr>
+              </a:solidFill>
+            </a:endParaRPr>
           </a:p>
         </p:txBody>
       </p:sp>
@@ -10335,14 +12364,20 @@
       </p:pic>
       <p:pic>
         <p:nvPicPr>
-          <p:cNvPr id="15365" name="Picture 5"/>
+          <p:cNvPr id="3074" name="Picture 2"/>
           <p:cNvPicPr>
             <a:picLocks noChangeAspect="1" noChangeArrowheads="1"/>
           </p:cNvPicPr>
           <p:nvPr/>
         </p:nvPicPr>
         <p:blipFill>
-          <a:blip r:embed="rId4" cstate="print"/>
+          <a:blip r:embed="rId4">
+            <a:extLst>
+              <a:ext uri="{28A0092B-C50C-407E-A947-70E740481C1C}">
+                <a14:useLocalDpi xmlns:a14="http://schemas.microsoft.com/office/drawing/2010/main" val="0"/>
+              </a:ext>
+            </a:extLst>
+          </a:blip>
           <a:srcRect/>
           <a:stretch>
             <a:fillRect/>
@@ -10350,19 +12385,35 @@
         </p:blipFill>
         <p:spPr bwMode="auto">
           <a:xfrm>
-            <a:off x="827584" y="5517644"/>
-            <a:ext cx="7848872" cy="1340356"/>
+            <a:off x="678323" y="5514975"/>
+            <a:ext cx="7848600" cy="1343025"/>
           </a:xfrm>
           <a:prstGeom prst="rect">
             <a:avLst/>
           </a:prstGeom>
           <a:noFill/>
-          <a:ln w="9525">
+          <a:ln>
             <a:noFill/>
-            <a:miter lim="800000"/>
-            <a:headEnd/>
-            <a:tailEnd/>
           </a:ln>
+          <a:extLst>
+            <a:ext uri="{909E8E84-426E-40DD-AFC4-6F175D3DCCD1}">
+              <a14:hiddenFill xmlns:a14="http://schemas.microsoft.com/office/drawing/2010/main">
+                <a:solidFill>
+                  <a:schemeClr val="accent1"/>
+                </a:solidFill>
+              </a14:hiddenFill>
+            </a:ext>
+            <a:ext uri="{91240B29-F687-4F45-9708-019B960494DF}">
+              <a14:hiddenLine xmlns:a14="http://schemas.microsoft.com/office/drawing/2010/main" w="9525">
+                <a:solidFill>
+                  <a:schemeClr val="tx1"/>
+                </a:solidFill>
+                <a:miter lim="800000"/>
+                <a:headEnd/>
+                <a:tailEnd/>
+              </a14:hiddenLine>
+            </a:ext>
+          </a:extLst>
         </p:spPr>
       </p:pic>
     </p:spTree>
@@ -10483,7 +12534,7 @@
                             </p:stCondLst>
                             <p:childTnLst>
                               <p:par>
-                                <p:cTn id="11" presetID="2" presetClass="entr" presetSubtype="2" fill="hold" nodeType="clickEffect">
+                                <p:cTn id="11" presetID="10" presetClass="entr" presetSubtype="0" fill="hold" nodeType="clickEffect">
                                   <p:stCondLst>
                                     <p:cond delay="0"/>
                                   </p:stCondLst>
@@ -10496,7 +12547,7 @@
                                           </p:stCondLst>
                                         </p:cTn>
                                         <p:tgtEl>
-                                          <p:spTgt spid="15365"/>
+                                          <p:spTgt spid="3074"/>
                                         </p:tgtEl>
                                         <p:attrNameLst>
                                           <p:attrName>style.visibility</p:attrName>
@@ -10506,52 +12557,14 @@
                                         <p:strVal val="visible"/>
                                       </p:to>
                                     </p:set>
-                                    <p:anim calcmode="lin" valueType="num">
-                                      <p:cBhvr additive="base">
-                                        <p:cTn id="13" dur="500" fill="hold"/>
-                                        <p:tgtEl>
-                                          <p:spTgt spid="15365"/>
-                                        </p:tgtEl>
-                                        <p:attrNameLst>
-                                          <p:attrName>ppt_x</p:attrName>
-                                        </p:attrNameLst>
-                                      </p:cBhvr>
-                                      <p:tavLst>
-                                        <p:tav tm="0">
-                                          <p:val>
-                                            <p:strVal val="1+#ppt_w/2"/>
-                                          </p:val>
-                                        </p:tav>
-                                        <p:tav tm="100000">
-                                          <p:val>
-                                            <p:strVal val="#ppt_x"/>
-                                          </p:val>
-                                        </p:tav>
-                                      </p:tavLst>
-                                    </p:anim>
-                                    <p:anim calcmode="lin" valueType="num">
-                                      <p:cBhvr additive="base">
-                                        <p:cTn id="14" dur="500" fill="hold"/>
-                                        <p:tgtEl>
-                                          <p:spTgt spid="15365"/>
-                                        </p:tgtEl>
-                                        <p:attrNameLst>
-                                          <p:attrName>ppt_y</p:attrName>
-                                        </p:attrNameLst>
-                                      </p:cBhvr>
-                                      <p:tavLst>
-                                        <p:tav tm="0">
-                                          <p:val>
-                                            <p:strVal val="#ppt_y"/>
-                                          </p:val>
-                                        </p:tav>
-                                        <p:tav tm="100000">
-                                          <p:val>
-                                            <p:strVal val="#ppt_y"/>
-                                          </p:val>
-                                        </p:tav>
-                                      </p:tavLst>
-                                    </p:anim>
+                                    <p:animEffect transition="in" filter="fade">
+                                      <p:cBhvr>
+                                        <p:cTn id="13" dur="500"/>
+                                        <p:tgtEl>
+                                          <p:spTgt spid="3074"/>
+                                        </p:tgtEl>
+                                      </p:cBhvr>
+                                    </p:animEffect>
                                   </p:childTnLst>
                                 </p:cTn>
                               </p:par>

</xml_diff>